<commit_message>
Edited week 8 lecture
</commit_message>
<xml_diff>
--- a/topic-08-Layout-2/talk-1/talk-1.pptx
+++ b/topic-08-Layout-2/talk-1/talk-1.pptx
@@ -5,7 +5,7 @@
     <p:sldMasterId id="2147483861" r:id="rId1"/>
   </p:sldMasterIdLst>
   <p:notesMasterIdLst>
-    <p:notesMasterId r:id="rId21"/>
+    <p:notesMasterId r:id="rId22"/>
   </p:notesMasterIdLst>
   <p:sldIdLst>
     <p:sldId id="256" r:id="rId2"/>
@@ -15,18 +15,19 @@
     <p:sldId id="259" r:id="rId6"/>
     <p:sldId id="260" r:id="rId7"/>
     <p:sldId id="261" r:id="rId8"/>
-    <p:sldId id="262" r:id="rId9"/>
-    <p:sldId id="263" r:id="rId10"/>
-    <p:sldId id="264" r:id="rId11"/>
-    <p:sldId id="265" r:id="rId12"/>
-    <p:sldId id="266" r:id="rId13"/>
-    <p:sldId id="267" r:id="rId14"/>
-    <p:sldId id="268" r:id="rId15"/>
-    <p:sldId id="269" r:id="rId16"/>
-    <p:sldId id="270" r:id="rId17"/>
-    <p:sldId id="273" r:id="rId18"/>
-    <p:sldId id="271" r:id="rId19"/>
-    <p:sldId id="274" r:id="rId20"/>
+    <p:sldId id="276" r:id="rId9"/>
+    <p:sldId id="262" r:id="rId10"/>
+    <p:sldId id="263" r:id="rId11"/>
+    <p:sldId id="264" r:id="rId12"/>
+    <p:sldId id="265" r:id="rId13"/>
+    <p:sldId id="266" r:id="rId14"/>
+    <p:sldId id="267" r:id="rId15"/>
+    <p:sldId id="268" r:id="rId16"/>
+    <p:sldId id="269" r:id="rId17"/>
+    <p:sldId id="270" r:id="rId18"/>
+    <p:sldId id="273" r:id="rId19"/>
+    <p:sldId id="271" r:id="rId20"/>
+    <p:sldId id="274" r:id="rId21"/>
   </p:sldIdLst>
   <p:sldSz cx="9144000" cy="6858000" type="screen4x3"/>
   <p:notesSz cx="6858000" cy="9144000"/>
@@ -127,7 +128,7 @@
   </p:defaultTextStyle>
   <p:extLst>
     <p:ext uri="{EFAFB233-063F-42B5-8137-9DF3F51BA10A}">
-      <p15:sldGuideLst xmlns:p15="http://schemas.microsoft.com/office/powerpoint/2012/main" xmlns="">
+      <p15:sldGuideLst xmlns="" xmlns:p15="http://schemas.microsoft.com/office/powerpoint/2012/main">
         <p15:guide id="1" orient="horz" pos="2160">
           <p15:clr>
             <a:srgbClr val="A4A3A4"/>
@@ -226,7 +227,7 @@
           <a:p>
             <a:fld id="{C3B67979-B798-40DB-B440-5D87E6EC6EEF}" type="datetimeFigureOut">
               <a:rPr lang="en-US" smtClean="0"/>
-              <a:t>11/5/2017</a:t>
+              <a:t>11/6/2017</a:t>
             </a:fld>
             <a:endParaRPr lang="en-US"/>
           </a:p>
@@ -1705,7 +1706,7 @@
           <a:p>
             <a:fld id="{4BC48473-ACCD-4242-806A-1249CC2C55A8}" type="datetimeFigureOut">
               <a:rPr lang="en-US" smtClean="0"/>
-              <a:t>11/5/2017</a:t>
+              <a:t>11/6/2017</a:t>
             </a:fld>
             <a:endParaRPr lang="en-US"/>
           </a:p>
@@ -1988,7 +1989,7 @@
           <a:p>
             <a:fld id="{4BC48473-ACCD-4242-806A-1249CC2C55A8}" type="datetimeFigureOut">
               <a:rPr lang="en-US" smtClean="0"/>
-              <a:t>11/5/2017</a:t>
+              <a:t>11/6/2017</a:t>
             </a:fld>
             <a:endParaRPr lang="en-US"/>
           </a:p>
@@ -2168,7 +2169,7 @@
           <a:p>
             <a:fld id="{4BC48473-ACCD-4242-806A-1249CC2C55A8}" type="datetimeFigureOut">
               <a:rPr lang="en-US" smtClean="0"/>
-              <a:t>11/5/2017</a:t>
+              <a:t>11/6/2017</a:t>
             </a:fld>
             <a:endParaRPr lang="en-US"/>
           </a:p>
@@ -2469,7 +2470,7 @@
           <a:p>
             <a:fld id="{4BC48473-ACCD-4242-806A-1249CC2C55A8}" type="datetimeFigureOut">
               <a:rPr lang="en-US" smtClean="0"/>
-              <a:t>11/5/2017</a:t>
+              <a:t>11/6/2017</a:t>
             </a:fld>
             <a:endParaRPr lang="en-US"/>
           </a:p>
@@ -3072,7 +3073,7 @@
           <a:p>
             <a:fld id="{4BC48473-ACCD-4242-806A-1249CC2C55A8}" type="datetimeFigureOut">
               <a:rPr lang="en-US" smtClean="0"/>
-              <a:t>11/5/2017</a:t>
+              <a:t>11/6/2017</a:t>
             </a:fld>
             <a:endParaRPr lang="en-US"/>
           </a:p>
@@ -4878,7 +4879,7 @@
           <a:p>
             <a:fld id="{4BC48473-ACCD-4242-806A-1249CC2C55A8}" type="datetimeFigureOut">
               <a:rPr lang="en-US" smtClean="0"/>
-              <a:t>11/5/2017</a:t>
+              <a:t>11/6/2017</a:t>
             </a:fld>
             <a:endParaRPr lang="en-US"/>
           </a:p>
@@ -4938,7 +4939,7 @@
   </p:clrMapOvr>
   <p:extLst mod="1">
     <p:ext uri="{DCECCB84-F9BA-43D5-87BE-67443E8EF086}">
-      <p15:sldGuideLst xmlns:p15="http://schemas.microsoft.com/office/powerpoint/2012/main" xmlns=""/>
+      <p15:sldGuideLst xmlns="" xmlns:p15="http://schemas.microsoft.com/office/powerpoint/2012/main"/>
     </p:ext>
   </p:extLst>
 </p:sldLayout>
@@ -5268,7 +5269,7 @@
           <a:p>
             <a:fld id="{4BC48473-ACCD-4242-806A-1249CC2C55A8}" type="datetimeFigureOut">
               <a:rPr lang="en-US" smtClean="0"/>
-              <a:t>11/5/2017</a:t>
+              <a:t>11/6/2017</a:t>
             </a:fld>
             <a:endParaRPr lang="en-US"/>
           </a:p>
@@ -5328,7 +5329,7 @@
   </p:clrMapOvr>
   <p:extLst mod="1">
     <p:ext uri="{DCECCB84-F9BA-43D5-87BE-67443E8EF086}">
-      <p15:sldGuideLst xmlns:p15="http://schemas.microsoft.com/office/powerpoint/2012/main" xmlns=""/>
+      <p15:sldGuideLst xmlns="" xmlns:p15="http://schemas.microsoft.com/office/powerpoint/2012/main"/>
     </p:ext>
   </p:extLst>
 </p:sldLayout>
@@ -5391,7 +5392,7 @@
           <a:p>
             <a:fld id="{4BC48473-ACCD-4242-806A-1249CC2C55A8}" type="datetimeFigureOut">
               <a:rPr lang="en-US" smtClean="0"/>
-              <a:t>11/5/2017</a:t>
+              <a:t>11/6/2017</a:t>
             </a:fld>
             <a:endParaRPr lang="en-US"/>
           </a:p>
@@ -5486,7 +5487,7 @@
           <a:p>
             <a:fld id="{4BC48473-ACCD-4242-806A-1249CC2C55A8}" type="datetimeFigureOut">
               <a:rPr lang="en-US" smtClean="0"/>
-              <a:t>11/5/2017</a:t>
+              <a:t>11/6/2017</a:t>
             </a:fld>
             <a:endParaRPr lang="en-US"/>
           </a:p>
@@ -6251,7 +6252,7 @@
           <a:p>
             <a:fld id="{4BC48473-ACCD-4242-806A-1249CC2C55A8}" type="datetimeFigureOut">
               <a:rPr lang="en-US" smtClean="0"/>
-              <a:t>11/5/2017</a:t>
+              <a:t>11/6/2017</a:t>
             </a:fld>
             <a:endParaRPr lang="en-US"/>
           </a:p>
@@ -6397,7 +6398,7 @@
   </p:clrMapOvr>
   <p:extLst mod="1">
     <p:ext uri="{DCECCB84-F9BA-43D5-87BE-67443E8EF086}">
-      <p15:sldGuideLst xmlns:p15="http://schemas.microsoft.com/office/powerpoint/2012/main" xmlns="">
+      <p15:sldGuideLst xmlns="" xmlns:p15="http://schemas.microsoft.com/office/powerpoint/2012/main">
         <p15:guide id="1" orient="horz" pos="696">
           <p15:clr>
             <a:srgbClr val="FBAE40"/>
@@ -7131,7 +7132,7 @@
           <a:p>
             <a:fld id="{4BC48473-ACCD-4242-806A-1249CC2C55A8}" type="datetimeFigureOut">
               <a:rPr lang="en-US" smtClean="0"/>
-              <a:t>11/5/2017</a:t>
+              <a:t>11/6/2017</a:t>
             </a:fld>
             <a:endParaRPr lang="en-US"/>
           </a:p>
@@ -7396,7 +7397,7 @@
           <a:p>
             <a:fld id="{4BC48473-ACCD-4242-806A-1249CC2C55A8}" type="datetimeFigureOut">
               <a:rPr lang="en-US" smtClean="0"/>
-              <a:t>11/5/2017</a:t>
+              <a:t>11/6/2017</a:t>
             </a:fld>
             <a:endParaRPr lang="en-US"/>
           </a:p>
@@ -8015,7 +8016,7 @@
   </p:txStyles>
   <p:extLst mod="1">
     <p:ext uri="{27BBF7A9-308A-43DC-89C8-2F10F3537804}">
-      <p15:sldGuideLst xmlns:p15="http://schemas.microsoft.com/office/powerpoint/2012/main" xmlns="">
+      <p15:sldGuideLst xmlns="" xmlns:p15="http://schemas.microsoft.com/office/powerpoint/2012/main">
         <p15:guide id="1" pos="792">
           <p15:clr>
             <a:srgbClr val="F26B43"/>
@@ -8160,6 +8161,737 @@
       </p:grpSpPr>
       <p:sp>
         <p:nvSpPr>
+          <p:cNvPr id="81" name="Shape 81"/>
+          <p:cNvSpPr>
+            <a:spLocks noGrp="1"/>
+          </p:cNvSpPr>
+          <p:nvPr>
+            <p:ph type="title"/>
+          </p:nvPr>
+        </p:nvSpPr>
+        <p:spPr>
+          <a:prstGeom prst="rect">
+            <a:avLst/>
+          </a:prstGeom>
+        </p:spPr>
+        <p:txBody>
+          <a:bodyPr/>
+          <a:lstStyle/>
+          <a:p>
+            <a:pPr lvl="0">
+              <a:defRPr sz="1800"/>
+            </a:pPr>
+            <a:r>
+              <a:rPr sz="3000"/>
+              <a:t>&lt;header&gt; &amp; &lt;footer&gt;</a:t>
+            </a:r>
+          </a:p>
+        </p:txBody>
+      </p:sp>
+      <p:sp>
+        <p:nvSpPr>
+          <p:cNvPr id="82" name="Shape 82"/>
+          <p:cNvSpPr>
+            <a:spLocks noGrp="1"/>
+          </p:cNvSpPr>
+          <p:nvPr>
+            <p:ph type="body" idx="1"/>
+          </p:nvPr>
+        </p:nvSpPr>
+        <p:spPr>
+          <a:xfrm>
+            <a:off x="1066800" y="1447800"/>
+            <a:ext cx="3634959" cy="2079676"/>
+          </a:xfrm>
+          <a:prstGeom prst="rect">
+            <a:avLst/>
+          </a:prstGeom>
+        </p:spPr>
+        <p:txBody>
+          <a:bodyPr>
+            <a:normAutofit fontScale="92500"/>
+          </a:bodyPr>
+          <a:lstStyle>
+            <a:lvl1pPr marL="0" indent="0" defTabSz="438150">
+              <a:spcBef>
+                <a:spcPts val="3100"/>
+              </a:spcBef>
+              <a:buSzTx/>
+              <a:buFontTx/>
+              <a:buNone/>
+              <a:defRPr sz="2700" i="1"/>
+            </a:lvl1pPr>
+          </a:lstStyle>
+          <a:p>
+            <a:pPr lvl="0">
+              <a:defRPr sz="1800" i="0"/>
+            </a:pPr>
+            <a:r>
+              <a:rPr sz="1900" dirty="0"/>
+              <a:t>"The header element represents introductory content for its nearest ancestor sectioning content or sectioning root element. A header typically contains a group of introductory or navigational aids.”</a:t>
+            </a:r>
+          </a:p>
+        </p:txBody>
+      </p:sp>
+      <p:sp>
+        <p:nvSpPr>
+          <p:cNvPr id="83" name="Shape 83"/>
+          <p:cNvSpPr/>
+          <p:nvPr/>
+        </p:nvSpPr>
+        <p:spPr>
+          <a:xfrm>
+            <a:off x="1219200" y="3886200"/>
+            <a:ext cx="3770578" cy="2214563"/>
+          </a:xfrm>
+          <a:prstGeom prst="rect">
+            <a:avLst/>
+          </a:prstGeom>
+          <a:ln w="12700">
+            <a:miter lim="400000"/>
+          </a:ln>
+          <a:extLst>
+            <a:ext uri="{C572A759-6A51-4108-AA02-DFA0A04FC94B}">
+              <ma14:wrappingTextBoxFlag xmlns:ma14="http://schemas.microsoft.com/office/mac/drawingml/2011/main" xmlns="" val="1"/>
+            </a:ext>
+          </a:extLst>
+        </p:spPr>
+        <p:txBody>
+          <a:bodyPr lIns="0" tIns="0" rIns="0" bIns="0">
+            <a:normAutofit/>
+          </a:bodyPr>
+          <a:lstStyle>
+            <a:lvl1pPr algn="l" defTabSz="414781">
+              <a:spcBef>
+                <a:spcPts val="2900"/>
+              </a:spcBef>
+              <a:defRPr sz="2556" i="1"/>
+            </a:lvl1pPr>
+          </a:lstStyle>
+          <a:p>
+            <a:pPr lvl="0">
+              <a:defRPr sz="1800" i="0"/>
+            </a:pPr>
+            <a:r>
+              <a:rPr sz="1800" dirty="0"/>
+              <a:t>"The footer element represents a footer for its nearest ancestor sectioning content or sectioning root element. A footer typically contains information about its section such as who wrote it, links to related documents, copyright data, and the like..”</a:t>
+            </a:r>
+          </a:p>
+        </p:txBody>
+      </p:sp>
+      <p:sp>
+        <p:nvSpPr>
+          <p:cNvPr id="84" name="Shape 84"/>
+          <p:cNvSpPr/>
+          <p:nvPr/>
+        </p:nvSpPr>
+        <p:spPr>
+          <a:xfrm>
+            <a:off x="5729774" y="2528754"/>
+            <a:ext cx="2576026" cy="1800493"/>
+          </a:xfrm>
+          <a:prstGeom prst="rect">
+            <a:avLst/>
+          </a:prstGeom>
+          <a:ln w="12700">
+            <a:solidFill/>
+            <a:miter lim="400000"/>
+          </a:ln>
+          <a:extLst>
+            <a:ext uri="{C572A759-6A51-4108-AA02-DFA0A04FC94B}">
+              <ma14:wrappingTextBoxFlag xmlns:ma14="http://schemas.microsoft.com/office/mac/drawingml/2011/main" xmlns="" val="1"/>
+            </a:ext>
+          </a:extLst>
+        </p:spPr>
+        <p:txBody>
+          <a:bodyPr wrap="none" lIns="0" tIns="0" rIns="0" bIns="0" anchor="ctr">
+            <a:spAutoFit/>
+          </a:bodyPr>
+          <a:lstStyle/>
+          <a:p>
+            <a:pPr defTabSz="321457">
+              <a:defRPr sz="1800"/>
+            </a:pPr>
+            <a:r>
+              <a:rPr sz="1300">
+                <a:solidFill>
+                  <a:srgbClr val="009193"/>
+                </a:solidFill>
+                <a:latin typeface="Monaco"/>
+                <a:ea typeface="Monaco"/>
+                <a:cs typeface="Monaco"/>
+                <a:sym typeface="Monaco"/>
+              </a:rPr>
+              <a:t>&lt;</a:t>
+            </a:r>
+            <a:r>
+              <a:rPr sz="1300">
+                <a:solidFill>
+                  <a:srgbClr val="4E9192"/>
+                </a:solidFill>
+                <a:latin typeface="Monaco"/>
+                <a:ea typeface="Monaco"/>
+                <a:cs typeface="Monaco"/>
+                <a:sym typeface="Monaco"/>
+              </a:rPr>
+              <a:t>header</a:t>
+            </a:r>
+            <a:r>
+              <a:rPr sz="1300">
+                <a:solidFill>
+                  <a:srgbClr val="009193"/>
+                </a:solidFill>
+                <a:latin typeface="Monaco"/>
+                <a:ea typeface="Monaco"/>
+                <a:cs typeface="Monaco"/>
+                <a:sym typeface="Monaco"/>
+              </a:rPr>
+              <a:t>&gt;</a:t>
+            </a:r>
+            <a:endParaRPr sz="1300">
+              <a:latin typeface="Monaco"/>
+              <a:ea typeface="Monaco"/>
+              <a:cs typeface="Monaco"/>
+              <a:sym typeface="Monaco"/>
+            </a:endParaRPr>
+          </a:p>
+          <a:p>
+            <a:pPr defTabSz="321457">
+              <a:defRPr sz="1800"/>
+            </a:pPr>
+            <a:r>
+              <a:rPr sz="1300">
+                <a:latin typeface="Monaco"/>
+                <a:ea typeface="Monaco"/>
+                <a:cs typeface="Monaco"/>
+                <a:sym typeface="Monaco"/>
+              </a:rPr>
+              <a:t> </a:t>
+            </a:r>
+            <a:r>
+              <a:rPr sz="1300">
+                <a:solidFill>
+                  <a:srgbClr val="009193"/>
+                </a:solidFill>
+                <a:latin typeface="Monaco"/>
+                <a:ea typeface="Monaco"/>
+                <a:cs typeface="Monaco"/>
+                <a:sym typeface="Monaco"/>
+              </a:rPr>
+              <a:t>&lt;</a:t>
+            </a:r>
+            <a:r>
+              <a:rPr sz="1300">
+                <a:solidFill>
+                  <a:srgbClr val="4E9192"/>
+                </a:solidFill>
+                <a:latin typeface="Monaco"/>
+                <a:ea typeface="Monaco"/>
+                <a:cs typeface="Monaco"/>
+                <a:sym typeface="Monaco"/>
+              </a:rPr>
+              <a:t>p</a:t>
+            </a:r>
+            <a:r>
+              <a:rPr sz="1300">
+                <a:solidFill>
+                  <a:srgbClr val="009193"/>
+                </a:solidFill>
+                <a:latin typeface="Monaco"/>
+                <a:ea typeface="Monaco"/>
+                <a:cs typeface="Monaco"/>
+                <a:sym typeface="Monaco"/>
+              </a:rPr>
+              <a:t>&gt;</a:t>
+            </a:r>
+            <a:r>
+              <a:rPr sz="1300">
+                <a:latin typeface="Monaco"/>
+                <a:ea typeface="Monaco"/>
+                <a:cs typeface="Monaco"/>
+                <a:sym typeface="Monaco"/>
+              </a:rPr>
+              <a:t>Welcome to...</a:t>
+            </a:r>
+            <a:r>
+              <a:rPr sz="1300">
+                <a:solidFill>
+                  <a:srgbClr val="009193"/>
+                </a:solidFill>
+                <a:latin typeface="Monaco"/>
+                <a:ea typeface="Monaco"/>
+                <a:cs typeface="Monaco"/>
+                <a:sym typeface="Monaco"/>
+              </a:rPr>
+              <a:t>&lt;/</a:t>
+            </a:r>
+            <a:r>
+              <a:rPr sz="1300">
+                <a:solidFill>
+                  <a:srgbClr val="4E9192"/>
+                </a:solidFill>
+                <a:latin typeface="Monaco"/>
+                <a:ea typeface="Monaco"/>
+                <a:cs typeface="Monaco"/>
+                <a:sym typeface="Monaco"/>
+              </a:rPr>
+              <a:t>p</a:t>
+            </a:r>
+            <a:r>
+              <a:rPr sz="1300">
+                <a:solidFill>
+                  <a:srgbClr val="009193"/>
+                </a:solidFill>
+                <a:latin typeface="Monaco"/>
+                <a:ea typeface="Monaco"/>
+                <a:cs typeface="Monaco"/>
+                <a:sym typeface="Monaco"/>
+              </a:rPr>
+              <a:t>&gt;</a:t>
+            </a:r>
+            <a:endParaRPr sz="1300">
+              <a:latin typeface="Monaco"/>
+              <a:ea typeface="Monaco"/>
+              <a:cs typeface="Monaco"/>
+              <a:sym typeface="Monaco"/>
+            </a:endParaRPr>
+          </a:p>
+          <a:p>
+            <a:pPr defTabSz="321457">
+              <a:defRPr sz="1800"/>
+            </a:pPr>
+            <a:r>
+              <a:rPr sz="1300">
+                <a:latin typeface="Monaco"/>
+                <a:ea typeface="Monaco"/>
+                <a:cs typeface="Monaco"/>
+                <a:sym typeface="Monaco"/>
+              </a:rPr>
+              <a:t> </a:t>
+            </a:r>
+            <a:r>
+              <a:rPr sz="1300">
+                <a:solidFill>
+                  <a:srgbClr val="009193"/>
+                </a:solidFill>
+                <a:latin typeface="Monaco"/>
+                <a:ea typeface="Monaco"/>
+                <a:cs typeface="Monaco"/>
+                <a:sym typeface="Monaco"/>
+              </a:rPr>
+              <a:t>&lt;</a:t>
+            </a:r>
+            <a:r>
+              <a:rPr sz="1300">
+                <a:solidFill>
+                  <a:srgbClr val="4E9192"/>
+                </a:solidFill>
+                <a:latin typeface="Monaco"/>
+                <a:ea typeface="Monaco"/>
+                <a:cs typeface="Monaco"/>
+                <a:sym typeface="Monaco"/>
+              </a:rPr>
+              <a:t>h1</a:t>
+            </a:r>
+            <a:r>
+              <a:rPr sz="1300">
+                <a:solidFill>
+                  <a:srgbClr val="009193"/>
+                </a:solidFill>
+                <a:latin typeface="Monaco"/>
+                <a:ea typeface="Monaco"/>
+                <a:cs typeface="Monaco"/>
+                <a:sym typeface="Monaco"/>
+              </a:rPr>
+              <a:t>&gt;</a:t>
+            </a:r>
+            <a:r>
+              <a:rPr sz="1300">
+                <a:latin typeface="Monaco"/>
+                <a:ea typeface="Monaco"/>
+                <a:cs typeface="Monaco"/>
+                <a:sym typeface="Monaco"/>
+              </a:rPr>
+              <a:t>Voidwars!</a:t>
+            </a:r>
+            <a:r>
+              <a:rPr sz="1300">
+                <a:solidFill>
+                  <a:srgbClr val="009193"/>
+                </a:solidFill>
+                <a:latin typeface="Monaco"/>
+                <a:ea typeface="Monaco"/>
+                <a:cs typeface="Monaco"/>
+                <a:sym typeface="Monaco"/>
+              </a:rPr>
+              <a:t>&lt;/</a:t>
+            </a:r>
+            <a:r>
+              <a:rPr sz="1300">
+                <a:solidFill>
+                  <a:srgbClr val="4E9192"/>
+                </a:solidFill>
+                <a:latin typeface="Monaco"/>
+                <a:ea typeface="Monaco"/>
+                <a:cs typeface="Monaco"/>
+                <a:sym typeface="Monaco"/>
+              </a:rPr>
+              <a:t>h1</a:t>
+            </a:r>
+            <a:r>
+              <a:rPr sz="1300">
+                <a:solidFill>
+                  <a:srgbClr val="009193"/>
+                </a:solidFill>
+                <a:latin typeface="Monaco"/>
+                <a:ea typeface="Monaco"/>
+                <a:cs typeface="Monaco"/>
+                <a:sym typeface="Monaco"/>
+              </a:rPr>
+              <a:t>&gt;</a:t>
+            </a:r>
+            <a:endParaRPr sz="1300">
+              <a:latin typeface="Monaco"/>
+              <a:ea typeface="Monaco"/>
+              <a:cs typeface="Monaco"/>
+              <a:sym typeface="Monaco"/>
+            </a:endParaRPr>
+          </a:p>
+          <a:p>
+            <a:pPr defTabSz="321457">
+              <a:defRPr sz="1800"/>
+            </a:pPr>
+            <a:r>
+              <a:rPr sz="1300">
+                <a:solidFill>
+                  <a:srgbClr val="009193"/>
+                </a:solidFill>
+                <a:latin typeface="Monaco"/>
+                <a:ea typeface="Monaco"/>
+                <a:cs typeface="Monaco"/>
+                <a:sym typeface="Monaco"/>
+              </a:rPr>
+              <a:t>&lt;/</a:t>
+            </a:r>
+            <a:r>
+              <a:rPr sz="1300">
+                <a:solidFill>
+                  <a:srgbClr val="4E9192"/>
+                </a:solidFill>
+                <a:latin typeface="Monaco"/>
+                <a:ea typeface="Monaco"/>
+                <a:cs typeface="Monaco"/>
+                <a:sym typeface="Monaco"/>
+              </a:rPr>
+              <a:t>header</a:t>
+            </a:r>
+            <a:r>
+              <a:rPr sz="1300">
+                <a:solidFill>
+                  <a:srgbClr val="009193"/>
+                </a:solidFill>
+                <a:latin typeface="Monaco"/>
+                <a:ea typeface="Monaco"/>
+                <a:cs typeface="Monaco"/>
+                <a:sym typeface="Monaco"/>
+              </a:rPr>
+              <a:t>&gt;</a:t>
+            </a:r>
+            <a:endParaRPr sz="1300">
+              <a:latin typeface="Monaco"/>
+              <a:ea typeface="Monaco"/>
+              <a:cs typeface="Monaco"/>
+              <a:sym typeface="Monaco"/>
+            </a:endParaRPr>
+          </a:p>
+          <a:p>
+            <a:pPr defTabSz="321457">
+              <a:defRPr sz="1800"/>
+            </a:pPr>
+            <a:endParaRPr sz="1300">
+              <a:latin typeface="Monaco"/>
+              <a:ea typeface="Monaco"/>
+              <a:cs typeface="Monaco"/>
+              <a:sym typeface="Monaco"/>
+            </a:endParaRPr>
+          </a:p>
+          <a:p>
+            <a:pPr defTabSz="321457">
+              <a:defRPr sz="1800"/>
+            </a:pPr>
+            <a:endParaRPr sz="1300">
+              <a:latin typeface="Monaco"/>
+              <a:ea typeface="Monaco"/>
+              <a:cs typeface="Monaco"/>
+              <a:sym typeface="Monaco"/>
+            </a:endParaRPr>
+          </a:p>
+          <a:p>
+            <a:pPr defTabSz="321457">
+              <a:defRPr sz="1800"/>
+            </a:pPr>
+            <a:r>
+              <a:rPr sz="1300">
+                <a:solidFill>
+                  <a:srgbClr val="009193"/>
+                </a:solidFill>
+                <a:latin typeface="Monaco"/>
+                <a:ea typeface="Monaco"/>
+                <a:cs typeface="Monaco"/>
+                <a:sym typeface="Monaco"/>
+              </a:rPr>
+              <a:t>&lt;</a:t>
+            </a:r>
+            <a:r>
+              <a:rPr sz="1300">
+                <a:solidFill>
+                  <a:srgbClr val="4E9192"/>
+                </a:solidFill>
+                <a:latin typeface="Monaco"/>
+                <a:ea typeface="Monaco"/>
+                <a:cs typeface="Monaco"/>
+                <a:sym typeface="Monaco"/>
+              </a:rPr>
+              <a:t>footer</a:t>
+            </a:r>
+            <a:r>
+              <a:rPr sz="1300">
+                <a:solidFill>
+                  <a:srgbClr val="009193"/>
+                </a:solidFill>
+                <a:latin typeface="Monaco"/>
+                <a:ea typeface="Monaco"/>
+                <a:cs typeface="Monaco"/>
+                <a:sym typeface="Monaco"/>
+              </a:rPr>
+              <a:t>&gt;</a:t>
+            </a:r>
+            <a:endParaRPr sz="1300">
+              <a:latin typeface="Monaco"/>
+              <a:ea typeface="Monaco"/>
+              <a:cs typeface="Monaco"/>
+              <a:sym typeface="Monaco"/>
+            </a:endParaRPr>
+          </a:p>
+          <a:p>
+            <a:pPr defTabSz="321457">
+              <a:defRPr sz="1800"/>
+            </a:pPr>
+            <a:r>
+              <a:rPr sz="1300">
+                <a:latin typeface="Monaco"/>
+                <a:ea typeface="Monaco"/>
+                <a:cs typeface="Monaco"/>
+                <a:sym typeface="Monaco"/>
+              </a:rPr>
+              <a:t>  </a:t>
+            </a:r>
+            <a:r>
+              <a:rPr sz="1300">
+                <a:solidFill>
+                  <a:srgbClr val="009193"/>
+                </a:solidFill>
+                <a:latin typeface="Monaco"/>
+                <a:ea typeface="Monaco"/>
+                <a:cs typeface="Monaco"/>
+                <a:sym typeface="Monaco"/>
+              </a:rPr>
+              <a:t>&lt;</a:t>
+            </a:r>
+            <a:r>
+              <a:rPr sz="1300">
+                <a:solidFill>
+                  <a:srgbClr val="4E9192"/>
+                </a:solidFill>
+                <a:latin typeface="Monaco"/>
+                <a:ea typeface="Monaco"/>
+                <a:cs typeface="Monaco"/>
+                <a:sym typeface="Monaco"/>
+              </a:rPr>
+              <a:t>a</a:t>
+            </a:r>
+            <a:r>
+              <a:rPr sz="1300">
+                <a:latin typeface="Monaco"/>
+                <a:ea typeface="Monaco"/>
+                <a:cs typeface="Monaco"/>
+                <a:sym typeface="Monaco"/>
+              </a:rPr>
+              <a:t> </a:t>
+            </a:r>
+            <a:r>
+              <a:rPr sz="1300">
+                <a:solidFill>
+                  <a:srgbClr val="932192"/>
+                </a:solidFill>
+                <a:latin typeface="Monaco"/>
+                <a:ea typeface="Monaco"/>
+                <a:cs typeface="Monaco"/>
+                <a:sym typeface="Monaco"/>
+              </a:rPr>
+              <a:t>href</a:t>
+            </a:r>
+            <a:r>
+              <a:rPr sz="1300">
+                <a:latin typeface="Monaco"/>
+                <a:ea typeface="Monaco"/>
+                <a:cs typeface="Monaco"/>
+                <a:sym typeface="Monaco"/>
+              </a:rPr>
+              <a:t>=</a:t>
+            </a:r>
+            <a:r>
+              <a:rPr sz="1300">
+                <a:solidFill>
+                  <a:srgbClr val="3933FF"/>
+                </a:solidFill>
+                <a:latin typeface="Monaco"/>
+                <a:ea typeface="Monaco"/>
+                <a:cs typeface="Monaco"/>
+                <a:sym typeface="Monaco"/>
+              </a:rPr>
+              <a:t>"../"</a:t>
+            </a:r>
+            <a:r>
+              <a:rPr sz="1300">
+                <a:solidFill>
+                  <a:srgbClr val="009193"/>
+                </a:solidFill>
+                <a:latin typeface="Monaco"/>
+                <a:ea typeface="Monaco"/>
+                <a:cs typeface="Monaco"/>
+                <a:sym typeface="Monaco"/>
+              </a:rPr>
+              <a:t>&gt;</a:t>
+            </a:r>
+            <a:r>
+              <a:rPr sz="1300">
+                <a:latin typeface="Monaco"/>
+                <a:ea typeface="Monaco"/>
+                <a:cs typeface="Monaco"/>
+                <a:sym typeface="Monaco"/>
+              </a:rPr>
+              <a:t>Back to index…</a:t>
+            </a:r>
+            <a:r>
+              <a:rPr sz="1300">
+                <a:solidFill>
+                  <a:srgbClr val="009193"/>
+                </a:solidFill>
+                <a:latin typeface="Monaco"/>
+                <a:ea typeface="Monaco"/>
+                <a:cs typeface="Monaco"/>
+                <a:sym typeface="Monaco"/>
+              </a:rPr>
+              <a:t>&lt;/</a:t>
+            </a:r>
+            <a:r>
+              <a:rPr sz="1300">
+                <a:solidFill>
+                  <a:srgbClr val="4E9192"/>
+                </a:solidFill>
+                <a:latin typeface="Monaco"/>
+                <a:ea typeface="Monaco"/>
+                <a:cs typeface="Monaco"/>
+                <a:sym typeface="Monaco"/>
+              </a:rPr>
+              <a:t>a</a:t>
+            </a:r>
+            <a:r>
+              <a:rPr sz="1300">
+                <a:solidFill>
+                  <a:srgbClr val="009193"/>
+                </a:solidFill>
+                <a:latin typeface="Monaco"/>
+                <a:ea typeface="Monaco"/>
+                <a:cs typeface="Monaco"/>
+                <a:sym typeface="Monaco"/>
+              </a:rPr>
+              <a:t>&gt;</a:t>
+            </a:r>
+            <a:endParaRPr sz="1300">
+              <a:latin typeface="Monaco"/>
+              <a:ea typeface="Monaco"/>
+              <a:cs typeface="Monaco"/>
+              <a:sym typeface="Monaco"/>
+            </a:endParaRPr>
+          </a:p>
+          <a:p>
+            <a:pPr defTabSz="321457">
+              <a:defRPr sz="1800"/>
+            </a:pPr>
+            <a:r>
+              <a:rPr sz="1300">
+                <a:solidFill>
+                  <a:srgbClr val="009193"/>
+                </a:solidFill>
+                <a:latin typeface="Monaco"/>
+                <a:ea typeface="Monaco"/>
+                <a:cs typeface="Monaco"/>
+                <a:sym typeface="Monaco"/>
+              </a:rPr>
+              <a:t>&lt;/</a:t>
+            </a:r>
+            <a:r>
+              <a:rPr sz="1300">
+                <a:solidFill>
+                  <a:srgbClr val="4E9192"/>
+                </a:solidFill>
+                <a:latin typeface="Monaco"/>
+                <a:ea typeface="Monaco"/>
+                <a:cs typeface="Monaco"/>
+                <a:sym typeface="Monaco"/>
+              </a:rPr>
+              <a:t>footer</a:t>
+            </a:r>
+            <a:r>
+              <a:rPr sz="1300">
+                <a:solidFill>
+                  <a:srgbClr val="009193"/>
+                </a:solidFill>
+                <a:latin typeface="Monaco"/>
+                <a:ea typeface="Monaco"/>
+                <a:cs typeface="Monaco"/>
+                <a:sym typeface="Monaco"/>
+              </a:rPr>
+              <a:t>&gt;</a:t>
+            </a:r>
+          </a:p>
+        </p:txBody>
+      </p:sp>
+    </p:spTree>
+    <p:extLst>
+      <p:ext uri="{BB962C8B-B14F-4D97-AF65-F5344CB8AC3E}">
+        <p14:creationId xmlns:p14="http://schemas.microsoft.com/office/powerpoint/2010/main" val="3904904131"/>
+      </p:ext>
+    </p:extLst>
+  </p:cSld>
+  <p:clrMapOvr>
+    <a:masterClrMapping/>
+  </p:clrMapOvr>
+  <p:transition spd="med"/>
+</p:sld>
+</file>
+
+<file path=ppt/slides/slide11.xml><?xml version="1.0" encoding="utf-8"?>
+<p:sld xmlns:a="http://schemas.openxmlformats.org/drawingml/2006/main" xmlns:r="http://schemas.openxmlformats.org/officeDocument/2006/relationships" xmlns:p="http://schemas.openxmlformats.org/presentationml/2006/main">
+  <p:cSld>
+    <p:spTree>
+      <p:nvGrpSpPr>
+        <p:cNvPr id="1" name=""/>
+        <p:cNvGrpSpPr/>
+        <p:nvPr/>
+      </p:nvGrpSpPr>
+      <p:grpSpPr>
+        <a:xfrm>
+          <a:off x="0" y="0"/>
+          <a:ext cx="0" cy="0"/>
+          <a:chOff x="0" y="0"/>
+          <a:chExt cx="0" cy="0"/>
+        </a:xfrm>
+      </p:grpSpPr>
+      <p:sp>
+        <p:nvSpPr>
           <p:cNvPr id="86" name="Shape 86"/>
           <p:cNvSpPr>
             <a:spLocks noGrp="1"/>
@@ -8301,7 +9033,7 @@
 </p:sld>
 </file>
 
-<file path=ppt/slides/slide11.xml><?xml version="1.0" encoding="utf-8"?>
+<file path=ppt/slides/slide12.xml><?xml version="1.0" encoding="utf-8"?>
 <p:sld xmlns:a="http://schemas.openxmlformats.org/drawingml/2006/main" xmlns:r="http://schemas.openxmlformats.org/officeDocument/2006/relationships" xmlns:p="http://schemas.openxmlformats.org/presentationml/2006/main">
   <p:cSld>
     <p:spTree>
@@ -8405,7 +9137,7 @@
 </p:sld>
 </file>
 
-<file path=ppt/slides/slide12.xml><?xml version="1.0" encoding="utf-8"?>
+<file path=ppt/slides/slide13.xml><?xml version="1.0" encoding="utf-8"?>
 <p:sld xmlns:a="http://schemas.openxmlformats.org/drawingml/2006/main" xmlns:r="http://schemas.openxmlformats.org/officeDocument/2006/relationships" xmlns:p="http://schemas.openxmlformats.org/presentationml/2006/main">
   <p:cSld>
     <p:spTree>
@@ -8546,7 +9278,7 @@
 </p:sld>
 </file>
 
-<file path=ppt/slides/slide13.xml><?xml version="1.0" encoding="utf-8"?>
+<file path=ppt/slides/slide14.xml><?xml version="1.0" encoding="utf-8"?>
 <p:sld xmlns:a="http://schemas.openxmlformats.org/drawingml/2006/main" xmlns:r="http://schemas.openxmlformats.org/officeDocument/2006/relationships" xmlns:p="http://schemas.openxmlformats.org/presentationml/2006/main">
   <p:cSld>
     <p:spTree>
@@ -8652,7 +9384,7 @@
 </p:sld>
 </file>
 
-<file path=ppt/slides/slide14.xml><?xml version="1.0" encoding="utf-8"?>
+<file path=ppt/slides/slide15.xml><?xml version="1.0" encoding="utf-8"?>
 <p:sld xmlns:a="http://schemas.openxmlformats.org/drawingml/2006/main" xmlns:r="http://schemas.openxmlformats.org/officeDocument/2006/relationships" xmlns:p="http://schemas.openxmlformats.org/presentationml/2006/main">
   <p:cSld>
     <p:spTree>
@@ -8768,7 +9500,7 @@
           </a:ln>
           <a:extLst>
             <a:ext uri="{C572A759-6A51-4108-AA02-DFA0A04FC94B}">
-              <ma14:wrappingTextBoxFlag xmlns="" xmlns:ma14="http://schemas.microsoft.com/office/mac/drawingml/2011/main" val="1"/>
+              <ma14:wrappingTextBoxFlag xmlns:ma14="http://schemas.microsoft.com/office/mac/drawingml/2011/main" xmlns="" val="1"/>
             </a:ext>
           </a:extLst>
         </p:spPr>
@@ -8782,7 +9514,7 @@
               <a:defRPr sz="1800"/>
             </a:pPr>
             <a:r>
-              <a:rPr sz="2500"/>
+              <a:rPr sz="2500" dirty="0"/>
               <a:t>&lt;header&gt;&lt;/header&gt;</a:t>
             </a:r>
           </a:p>
@@ -8791,8 +9523,24 @@
               <a:defRPr sz="1800"/>
             </a:pPr>
             <a:r>
-              <a:rPr sz="2500"/>
-              <a:t>&lt;nav&gt;&lt;/nav&gt;</a:t>
+              <a:rPr sz="2500" dirty="0"/>
+              <a:t>&lt;</a:t>
+            </a:r>
+            <a:r>
+              <a:rPr sz="2500" dirty="0" err="1"/>
+              <a:t>nav</a:t>
+            </a:r>
+            <a:r>
+              <a:rPr sz="2500" dirty="0"/>
+              <a:t>&gt;&lt;/</a:t>
+            </a:r>
+            <a:r>
+              <a:rPr sz="2500" dirty="0" err="1"/>
+              <a:t>nav</a:t>
+            </a:r>
+            <a:r>
+              <a:rPr sz="2500" dirty="0"/>
+              <a:t>&gt;</a:t>
             </a:r>
           </a:p>
           <a:p>
@@ -8800,8 +9548,24 @@
               <a:defRPr sz="1800"/>
             </a:pPr>
             <a:r>
-              <a:rPr sz="2500"/>
-              <a:t>&lt;main&gt;&lt;main&gt;</a:t>
+              <a:rPr sz="2500" dirty="0"/>
+              <a:t>&lt;main</a:t>
+            </a:r>
+            <a:r>
+              <a:rPr sz="2500" dirty="0" smtClean="0"/>
+              <a:t>&gt;&lt;</a:t>
+            </a:r>
+            <a:r>
+              <a:rPr lang="en-IE" sz="2500" dirty="0" smtClean="0"/>
+              <a:t>/</a:t>
+            </a:r>
+            <a:r>
+              <a:rPr sz="2500" dirty="0" smtClean="0"/>
+              <a:t>main</a:t>
+            </a:r>
+            <a:r>
+              <a:rPr sz="2500" dirty="0"/>
+              <a:t>&gt;</a:t>
             </a:r>
           </a:p>
           <a:p>
@@ -8809,7 +9573,7 @@
               <a:defRPr sz="1800"/>
             </a:pPr>
             <a:r>
-              <a:rPr sz="2500"/>
+              <a:rPr sz="2500" dirty="0"/>
               <a:t>&lt;aside&gt;&lt;/aside&gt;</a:t>
             </a:r>
           </a:p>
@@ -8818,7 +9582,7 @@
               <a:defRPr sz="1800"/>
             </a:pPr>
             <a:r>
-              <a:rPr sz="2500"/>
+              <a:rPr sz="2500" dirty="0"/>
               <a:t>&lt;footer&gt;&lt;/footer&gt;</a:t>
             </a:r>
           </a:p>
@@ -8838,7 +9602,7 @@
 </p:sld>
 </file>
 
-<file path=ppt/slides/slide15.xml><?xml version="1.0" encoding="utf-8"?>
+<file path=ppt/slides/slide16.xml><?xml version="1.0" encoding="utf-8"?>
 <p:sld xmlns:a="http://schemas.openxmlformats.org/drawingml/2006/main" xmlns:r="http://schemas.openxmlformats.org/officeDocument/2006/relationships" xmlns:p="http://schemas.openxmlformats.org/presentationml/2006/main">
   <p:cSld>
     <p:spTree>
@@ -8949,7 +9713,7 @@
           </a:ln>
           <a:extLst>
             <a:ext uri="{C572A759-6A51-4108-AA02-DFA0A04FC94B}">
-              <ma14:wrappingTextBoxFlag xmlns="" xmlns:ma14="http://schemas.microsoft.com/office/mac/drawingml/2011/main" val="1"/>
+              <ma14:wrappingTextBoxFlag xmlns:ma14="http://schemas.microsoft.com/office/mac/drawingml/2011/main" xmlns="" val="1"/>
             </a:ext>
           </a:extLst>
         </p:spPr>
@@ -8963,7 +9727,7 @@
               <a:defRPr sz="1800"/>
             </a:pPr>
             <a:r>
-              <a:rPr sz="2500"/>
+              <a:rPr sz="2500" dirty="0"/>
               <a:t>&lt;footer&gt;&lt;/footer&gt;</a:t>
             </a:r>
           </a:p>
@@ -8972,8 +9736,24 @@
               <a:defRPr sz="1800"/>
             </a:pPr>
             <a:r>
-              <a:rPr sz="2500"/>
-              <a:t>&lt;main&gt;&lt;main&gt;</a:t>
+              <a:rPr sz="2500" dirty="0"/>
+              <a:t>&lt;main</a:t>
+            </a:r>
+            <a:r>
+              <a:rPr sz="2500" dirty="0" smtClean="0"/>
+              <a:t>&gt;&lt;</a:t>
+            </a:r>
+            <a:r>
+              <a:rPr lang="en-IE" sz="2500" dirty="0" smtClean="0"/>
+              <a:t>/</a:t>
+            </a:r>
+            <a:r>
+              <a:rPr sz="2500" dirty="0" smtClean="0"/>
+              <a:t>main</a:t>
+            </a:r>
+            <a:r>
+              <a:rPr sz="2500" dirty="0"/>
+              <a:t>&gt;</a:t>
             </a:r>
           </a:p>
           <a:p>
@@ -8981,8 +9761,24 @@
               <a:defRPr sz="1800"/>
             </a:pPr>
             <a:r>
-              <a:rPr sz="2500"/>
-              <a:t>&lt;nav&gt;&lt;/nav&gt;</a:t>
+              <a:rPr sz="2500" dirty="0"/>
+              <a:t>&lt;</a:t>
+            </a:r>
+            <a:r>
+              <a:rPr sz="2500" dirty="0" err="1"/>
+              <a:t>nav</a:t>
+            </a:r>
+            <a:r>
+              <a:rPr sz="2500" dirty="0"/>
+              <a:t>&gt;&lt;/</a:t>
+            </a:r>
+            <a:r>
+              <a:rPr sz="2500" dirty="0" err="1"/>
+              <a:t>nav</a:t>
+            </a:r>
+            <a:r>
+              <a:rPr sz="2500" dirty="0"/>
+              <a:t>&gt;</a:t>
             </a:r>
           </a:p>
         </p:txBody>
@@ -9001,7 +9797,7 @@
 </p:sld>
 </file>
 
-<file path=ppt/slides/slide16.xml><?xml version="1.0" encoding="utf-8"?>
+<file path=ppt/slides/slide17.xml><?xml version="1.0" encoding="utf-8"?>
 <p:sld xmlns:a="http://schemas.openxmlformats.org/drawingml/2006/main" xmlns:r="http://schemas.openxmlformats.org/officeDocument/2006/relationships" xmlns:p="http://schemas.openxmlformats.org/presentationml/2006/main">
   <p:cSld>
     <p:spTree>
@@ -9112,7 +9908,7 @@
           </a:ln>
           <a:extLst>
             <a:ext uri="{C572A759-6A51-4108-AA02-DFA0A04FC94B}">
-              <ma14:wrappingTextBoxFlag xmlns="" xmlns:ma14="http://schemas.microsoft.com/office/mac/drawingml/2011/main" val="1"/>
+              <ma14:wrappingTextBoxFlag xmlns:ma14="http://schemas.microsoft.com/office/mac/drawingml/2011/main" xmlns="" val="1"/>
             </a:ext>
           </a:extLst>
         </p:spPr>
@@ -9126,7 +9922,7 @@
               <a:defRPr sz="1800"/>
             </a:pPr>
             <a:r>
-              <a:rPr sz="2500"/>
+              <a:rPr sz="2500" dirty="0"/>
               <a:t>&lt;header&gt;</a:t>
             </a:r>
           </a:p>
@@ -9135,8 +9931,24 @@
               <a:defRPr sz="1800"/>
             </a:pPr>
             <a:r>
-              <a:rPr sz="2500"/>
-              <a:t>&lt;nav&gt;&lt;/nav&gt;</a:t>
+              <a:rPr sz="2500" dirty="0"/>
+              <a:t>&lt;</a:t>
+            </a:r>
+            <a:r>
+              <a:rPr sz="2500" dirty="0" err="1"/>
+              <a:t>nav</a:t>
+            </a:r>
+            <a:r>
+              <a:rPr sz="2500" dirty="0"/>
+              <a:t>&gt;&lt;/</a:t>
+            </a:r>
+            <a:r>
+              <a:rPr sz="2500" dirty="0" err="1"/>
+              <a:t>nav</a:t>
+            </a:r>
+            <a:r>
+              <a:rPr sz="2500" dirty="0"/>
+              <a:t>&gt;</a:t>
             </a:r>
           </a:p>
           <a:p>
@@ -9144,7 +9956,7 @@
               <a:defRPr sz="1800"/>
             </a:pPr>
             <a:r>
-              <a:rPr sz="2500"/>
+              <a:rPr sz="2500" dirty="0"/>
               <a:t>&lt;/header&gt;</a:t>
             </a:r>
           </a:p>
@@ -9153,8 +9965,24 @@
               <a:defRPr sz="1800"/>
             </a:pPr>
             <a:r>
-              <a:rPr sz="2500"/>
-              <a:t>&lt;main&gt;&lt;main&gt;</a:t>
+              <a:rPr sz="2500" dirty="0"/>
+              <a:t>&lt;main</a:t>
+            </a:r>
+            <a:r>
+              <a:rPr sz="2500" dirty="0" smtClean="0"/>
+              <a:t>&gt;&lt;</a:t>
+            </a:r>
+            <a:r>
+              <a:rPr lang="en-IE" sz="2500" dirty="0" smtClean="0"/>
+              <a:t>/</a:t>
+            </a:r>
+            <a:r>
+              <a:rPr sz="2500" dirty="0" smtClean="0"/>
+              <a:t>main</a:t>
+            </a:r>
+            <a:r>
+              <a:rPr sz="2500" dirty="0"/>
+              <a:t>&gt;</a:t>
             </a:r>
           </a:p>
           <a:p>
@@ -9162,7 +9990,7 @@
               <a:defRPr sz="1800"/>
             </a:pPr>
             <a:r>
-              <a:rPr sz="2500"/>
+              <a:rPr sz="2500" dirty="0"/>
               <a:t>&lt;aside&gt;&lt;/aside&gt;</a:t>
             </a:r>
           </a:p>
@@ -9171,7 +9999,7 @@
               <a:defRPr sz="1800"/>
             </a:pPr>
             <a:r>
-              <a:rPr sz="2500"/>
+              <a:rPr sz="2500" dirty="0"/>
               <a:t>&lt;footer&gt;&lt;/footer&gt;</a:t>
             </a:r>
           </a:p>
@@ -9181,154 +10009,6 @@
     <p:extLst>
       <p:ext uri="{BB962C8B-B14F-4D97-AF65-F5344CB8AC3E}">
         <p14:creationId xmlns:p14="http://schemas.microsoft.com/office/powerpoint/2010/main" val="1401815647"/>
-      </p:ext>
-    </p:extLst>
-  </p:cSld>
-  <p:clrMapOvr>
-    <a:masterClrMapping/>
-  </p:clrMapOvr>
-  <p:transition spd="med"/>
-</p:sld>
-</file>
-
-<file path=ppt/slides/slide17.xml><?xml version="1.0" encoding="utf-8"?>
-<p:sld xmlns:a="http://schemas.openxmlformats.org/drawingml/2006/main" xmlns:r="http://schemas.openxmlformats.org/officeDocument/2006/relationships" xmlns:p="http://schemas.openxmlformats.org/presentationml/2006/main">
-  <p:cSld>
-    <p:spTree>
-      <p:nvGrpSpPr>
-        <p:cNvPr id="1" name=""/>
-        <p:cNvGrpSpPr/>
-        <p:nvPr/>
-      </p:nvGrpSpPr>
-      <p:grpSpPr>
-        <a:xfrm>
-          <a:off x="0" y="0"/>
-          <a:ext cx="0" cy="0"/>
-          <a:chOff x="0" y="0"/>
-          <a:chExt cx="0" cy="0"/>
-        </a:xfrm>
-      </p:grpSpPr>
-      <p:sp>
-        <p:nvSpPr>
-          <p:cNvPr id="2" name="Title 1"/>
-          <p:cNvSpPr>
-            <a:spLocks noGrp="1"/>
-          </p:cNvSpPr>
-          <p:nvPr>
-            <p:ph type="title"/>
-          </p:nvPr>
-        </p:nvSpPr>
-        <p:spPr/>
-        <p:txBody>
-          <a:bodyPr/>
-          <a:lstStyle/>
-          <a:p>
-            <a:r>
-              <a:rPr lang="en-IE" dirty="0" err="1" smtClean="0"/>
-              <a:t>Css</a:t>
-            </a:r>
-            <a:r>
-              <a:rPr lang="en-IE" dirty="0" smtClean="0"/>
-              <a:t> example</a:t>
-            </a:r>
-            <a:endParaRPr lang="en-IE" dirty="0"/>
-          </a:p>
-        </p:txBody>
-      </p:sp>
-      <p:sp>
-        <p:nvSpPr>
-          <p:cNvPr id="3" name="Text Placeholder 2"/>
-          <p:cNvSpPr>
-            <a:spLocks noGrp="1"/>
-          </p:cNvSpPr>
-          <p:nvPr>
-            <p:ph type="body" idx="1"/>
-          </p:nvPr>
-        </p:nvSpPr>
-        <p:spPr>
-          <a:xfrm>
-            <a:off x="938758" y="2286002"/>
-            <a:ext cx="2490242" cy="3593591"/>
-          </a:xfrm>
-        </p:spPr>
-        <p:txBody>
-          <a:bodyPr/>
-          <a:lstStyle/>
-          <a:p>
-            <a:r>
-              <a:rPr lang="en-IE" dirty="0" smtClean="0"/>
-              <a:t>All of the semantic structural elements mentioned above can have CSS styles applied to them to control their appearance and position</a:t>
-            </a:r>
-          </a:p>
-          <a:p>
-            <a:endParaRPr lang="en-IE" dirty="0"/>
-          </a:p>
-          <a:p>
-            <a:pPr marL="0" indent="0">
-              <a:buNone/>
-            </a:pPr>
-            <a:endParaRPr lang="en-IE" dirty="0"/>
-          </a:p>
-        </p:txBody>
-      </p:sp>
-      <p:pic>
-        <p:nvPicPr>
-          <p:cNvPr id="1026" name="Picture 2"/>
-          <p:cNvPicPr>
-            <a:picLocks noChangeAspect="1" noChangeArrowheads="1"/>
-          </p:cNvPicPr>
-          <p:nvPr/>
-        </p:nvPicPr>
-        <p:blipFill>
-          <a:blip r:embed="rId2">
-            <a:extLst>
-              <a:ext uri="{28A0092B-C50C-407E-A947-70E740481C1C}">
-                <a14:useLocalDpi xmlns:a14="http://schemas.microsoft.com/office/drawing/2010/main" val="0"/>
-              </a:ext>
-            </a:extLst>
-          </a:blip>
-          <a:srcRect/>
-          <a:stretch>
-            <a:fillRect/>
-          </a:stretch>
-        </p:blipFill>
-        <p:spPr bwMode="auto">
-          <a:xfrm>
-            <a:off x="3559214" y="2257425"/>
-            <a:ext cx="5203786" cy="3914775"/>
-          </a:xfrm>
-          <a:prstGeom prst="rect">
-            <a:avLst/>
-          </a:prstGeom>
-          <a:noFill/>
-          <a:ln>
-            <a:noFill/>
-          </a:ln>
-          <a:extLst>
-            <a:ext uri="{909E8E84-426E-40DD-AFC4-6F175D3DCCD1}">
-              <a14:hiddenFill xmlns:a14="http://schemas.microsoft.com/office/drawing/2010/main">
-                <a:solidFill>
-                  <a:schemeClr val="accent1"/>
-                </a:solidFill>
-              </a14:hiddenFill>
-            </a:ext>
-            <a:ext uri="{91240B29-F687-4F45-9708-019B960494DF}">
-              <a14:hiddenLine xmlns:a14="http://schemas.microsoft.com/office/drawing/2010/main" w="9525">
-                <a:solidFill>
-                  <a:schemeClr val="tx1"/>
-                </a:solidFill>
-                <a:miter lim="800000"/>
-                <a:headEnd/>
-                <a:tailEnd/>
-              </a14:hiddenLine>
-            </a:ext>
-          </a:extLst>
-        </p:spPr>
-      </p:pic>
-    </p:spTree>
-    <p:extLst>
-      <p:ext uri="{BB962C8B-B14F-4D97-AF65-F5344CB8AC3E}">
-        <p14:creationId xmlns:p14="http://schemas.microsoft.com/office/powerpoint/2010/main" val="2174674506"/>
       </p:ext>
     </p:extLst>
   </p:cSld>
@@ -9372,6 +10052,154 @@
           <a:lstStyle/>
           <a:p>
             <a:r>
+              <a:rPr lang="en-IE" dirty="0" err="1" smtClean="0"/>
+              <a:t>Css</a:t>
+            </a:r>
+            <a:r>
+              <a:rPr lang="en-IE" dirty="0" smtClean="0"/>
+              <a:t> example</a:t>
+            </a:r>
+            <a:endParaRPr lang="en-IE" dirty="0"/>
+          </a:p>
+        </p:txBody>
+      </p:sp>
+      <p:sp>
+        <p:nvSpPr>
+          <p:cNvPr id="3" name="Text Placeholder 2"/>
+          <p:cNvSpPr>
+            <a:spLocks noGrp="1"/>
+          </p:cNvSpPr>
+          <p:nvPr>
+            <p:ph type="body" idx="1"/>
+          </p:nvPr>
+        </p:nvSpPr>
+        <p:spPr>
+          <a:xfrm>
+            <a:off x="938758" y="2286002"/>
+            <a:ext cx="2490242" cy="3593591"/>
+          </a:xfrm>
+        </p:spPr>
+        <p:txBody>
+          <a:bodyPr/>
+          <a:lstStyle/>
+          <a:p>
+            <a:r>
+              <a:rPr lang="en-IE" dirty="0" smtClean="0"/>
+              <a:t>All of the semantic structural elements mentioned above can have CSS styles applied to them to control their appearance and position</a:t>
+            </a:r>
+          </a:p>
+          <a:p>
+            <a:endParaRPr lang="en-IE" dirty="0"/>
+          </a:p>
+          <a:p>
+            <a:pPr marL="0" indent="0">
+              <a:buNone/>
+            </a:pPr>
+            <a:endParaRPr lang="en-IE" dirty="0"/>
+          </a:p>
+        </p:txBody>
+      </p:sp>
+      <p:pic>
+        <p:nvPicPr>
+          <p:cNvPr id="1026" name="Picture 2"/>
+          <p:cNvPicPr>
+            <a:picLocks noChangeAspect="1" noChangeArrowheads="1"/>
+          </p:cNvPicPr>
+          <p:nvPr/>
+        </p:nvPicPr>
+        <p:blipFill>
+          <a:blip r:embed="rId2">
+            <a:extLst>
+              <a:ext uri="{28A0092B-C50C-407E-A947-70E740481C1C}">
+                <a14:useLocalDpi xmlns:a14="http://schemas.microsoft.com/office/drawing/2010/main" val="0"/>
+              </a:ext>
+            </a:extLst>
+          </a:blip>
+          <a:srcRect/>
+          <a:stretch>
+            <a:fillRect/>
+          </a:stretch>
+        </p:blipFill>
+        <p:spPr bwMode="auto">
+          <a:xfrm>
+            <a:off x="3559214" y="2257425"/>
+            <a:ext cx="5203786" cy="3914775"/>
+          </a:xfrm>
+          <a:prstGeom prst="rect">
+            <a:avLst/>
+          </a:prstGeom>
+          <a:noFill/>
+          <a:ln>
+            <a:noFill/>
+          </a:ln>
+          <a:extLst>
+            <a:ext uri="{909E8E84-426E-40DD-AFC4-6F175D3DCCD1}">
+              <a14:hiddenFill xmlns:a14="http://schemas.microsoft.com/office/drawing/2010/main">
+                <a:solidFill>
+                  <a:schemeClr val="accent1"/>
+                </a:solidFill>
+              </a14:hiddenFill>
+            </a:ext>
+            <a:ext uri="{91240B29-F687-4F45-9708-019B960494DF}">
+              <a14:hiddenLine xmlns:a14="http://schemas.microsoft.com/office/drawing/2010/main" w="9525">
+                <a:solidFill>
+                  <a:schemeClr val="tx1"/>
+                </a:solidFill>
+                <a:miter lim="800000"/>
+                <a:headEnd/>
+                <a:tailEnd/>
+              </a14:hiddenLine>
+            </a:ext>
+          </a:extLst>
+        </p:spPr>
+      </p:pic>
+    </p:spTree>
+    <p:extLst>
+      <p:ext uri="{BB962C8B-B14F-4D97-AF65-F5344CB8AC3E}">
+        <p14:creationId xmlns:p14="http://schemas.microsoft.com/office/powerpoint/2010/main" val="2174674506"/>
+      </p:ext>
+    </p:extLst>
+  </p:cSld>
+  <p:clrMapOvr>
+    <a:masterClrMapping/>
+  </p:clrMapOvr>
+  <p:transition spd="med"/>
+</p:sld>
+</file>
+
+<file path=ppt/slides/slide19.xml><?xml version="1.0" encoding="utf-8"?>
+<p:sld xmlns:a="http://schemas.openxmlformats.org/drawingml/2006/main" xmlns:r="http://schemas.openxmlformats.org/officeDocument/2006/relationships" xmlns:p="http://schemas.openxmlformats.org/presentationml/2006/main">
+  <p:cSld>
+    <p:spTree>
+      <p:nvGrpSpPr>
+        <p:cNvPr id="1" name=""/>
+        <p:cNvGrpSpPr/>
+        <p:nvPr/>
+      </p:nvGrpSpPr>
+      <p:grpSpPr>
+        <a:xfrm>
+          <a:off x="0" y="0"/>
+          <a:ext cx="0" cy="0"/>
+          <a:chOff x="0" y="0"/>
+          <a:chExt cx="0" cy="0"/>
+        </a:xfrm>
+      </p:grpSpPr>
+      <p:sp>
+        <p:nvSpPr>
+          <p:cNvPr id="2" name="Title 1"/>
+          <p:cNvSpPr>
+            <a:spLocks noGrp="1"/>
+          </p:cNvSpPr>
+          <p:nvPr>
+            <p:ph type="title"/>
+          </p:nvPr>
+        </p:nvSpPr>
+        <p:spPr/>
+        <p:txBody>
+          <a:bodyPr/>
+          <a:lstStyle/>
+          <a:p>
+            <a:r>
               <a:rPr lang="en-IE" dirty="0" smtClean="0"/>
               <a:t>Figure and </a:t>
             </a:r>
@@ -9491,7 +10319,97 @@
 </p:sld>
 </file>
 
-<file path=ppt/slides/slide19.xml><?xml version="1.0" encoding="utf-8"?>
+<file path=ppt/slides/slide2.xml><?xml version="1.0" encoding="utf-8"?>
+<p:sld xmlns:a="http://schemas.openxmlformats.org/drawingml/2006/main" xmlns:r="http://schemas.openxmlformats.org/officeDocument/2006/relationships" xmlns:p="http://schemas.openxmlformats.org/presentationml/2006/main">
+  <p:cSld>
+    <p:spTree>
+      <p:nvGrpSpPr>
+        <p:cNvPr id="1" name=""/>
+        <p:cNvGrpSpPr/>
+        <p:nvPr/>
+      </p:nvGrpSpPr>
+      <p:grpSpPr>
+        <a:xfrm>
+          <a:off x="0" y="0"/>
+          <a:ext cx="0" cy="0"/>
+          <a:chOff x="0" y="0"/>
+          <a:chExt cx="0" cy="0"/>
+        </a:xfrm>
+      </p:grpSpPr>
+      <p:sp>
+        <p:nvSpPr>
+          <p:cNvPr id="2" name="Title 1"/>
+          <p:cNvSpPr>
+            <a:spLocks noGrp="1"/>
+          </p:cNvSpPr>
+          <p:nvPr>
+            <p:ph type="title"/>
+          </p:nvPr>
+        </p:nvSpPr>
+        <p:spPr/>
+        <p:txBody>
+          <a:bodyPr/>
+          <a:lstStyle/>
+          <a:p>
+            <a:r>
+              <a:rPr lang="en-IE" dirty="0" smtClean="0"/>
+              <a:t>Html5 semantic elements</a:t>
+            </a:r>
+            <a:endParaRPr lang="en-IE" dirty="0"/>
+          </a:p>
+        </p:txBody>
+      </p:sp>
+      <p:sp>
+        <p:nvSpPr>
+          <p:cNvPr id="3" name="Content Placeholder 2"/>
+          <p:cNvSpPr>
+            <a:spLocks noGrp="1"/>
+          </p:cNvSpPr>
+          <p:nvPr>
+            <p:ph idx="1"/>
+          </p:nvPr>
+        </p:nvSpPr>
+        <p:spPr/>
+        <p:txBody>
+          <a:bodyPr/>
+          <a:lstStyle/>
+          <a:p>
+            <a:r>
+              <a:rPr lang="en-IE" dirty="0" smtClean="0"/>
+              <a:t>The need for semantic elements</a:t>
+            </a:r>
+          </a:p>
+          <a:p>
+            <a:r>
+              <a:rPr lang="en-IE" dirty="0" smtClean="0"/>
+              <a:t>Structural/layout elements</a:t>
+            </a:r>
+          </a:p>
+          <a:p>
+            <a:r>
+              <a:rPr lang="en-IE" dirty="0" smtClean="0"/>
+              <a:t>Figures and captions</a:t>
+            </a:r>
+          </a:p>
+          <a:p>
+            <a:endParaRPr lang="en-IE" dirty="0"/>
+          </a:p>
+        </p:txBody>
+      </p:sp>
+    </p:spTree>
+    <p:extLst>
+      <p:ext uri="{BB962C8B-B14F-4D97-AF65-F5344CB8AC3E}">
+        <p14:creationId xmlns:p14="http://schemas.microsoft.com/office/powerpoint/2010/main" val="707082873"/>
+      </p:ext>
+    </p:extLst>
+  </p:cSld>
+  <p:clrMapOvr>
+    <a:masterClrMapping/>
+  </p:clrMapOvr>
+</p:sld>
+</file>
+
+<file path=ppt/slides/slide20.xml><?xml version="1.0" encoding="utf-8"?>
 <p:sld xmlns:a="http://schemas.openxmlformats.org/drawingml/2006/main" xmlns:r="http://schemas.openxmlformats.org/officeDocument/2006/relationships" xmlns:p="http://schemas.openxmlformats.org/presentationml/2006/main">
   <p:cSld>
     <p:spTree>
@@ -9727,96 +10645,6 @@
     <a:masterClrMapping/>
   </p:clrMapOvr>
   <p:transition spd="med"/>
-</p:sld>
-</file>
-
-<file path=ppt/slides/slide2.xml><?xml version="1.0" encoding="utf-8"?>
-<p:sld xmlns:a="http://schemas.openxmlformats.org/drawingml/2006/main" xmlns:r="http://schemas.openxmlformats.org/officeDocument/2006/relationships" xmlns:p="http://schemas.openxmlformats.org/presentationml/2006/main">
-  <p:cSld>
-    <p:spTree>
-      <p:nvGrpSpPr>
-        <p:cNvPr id="1" name=""/>
-        <p:cNvGrpSpPr/>
-        <p:nvPr/>
-      </p:nvGrpSpPr>
-      <p:grpSpPr>
-        <a:xfrm>
-          <a:off x="0" y="0"/>
-          <a:ext cx="0" cy="0"/>
-          <a:chOff x="0" y="0"/>
-          <a:chExt cx="0" cy="0"/>
-        </a:xfrm>
-      </p:grpSpPr>
-      <p:sp>
-        <p:nvSpPr>
-          <p:cNvPr id="2" name="Title 1"/>
-          <p:cNvSpPr>
-            <a:spLocks noGrp="1"/>
-          </p:cNvSpPr>
-          <p:nvPr>
-            <p:ph type="title"/>
-          </p:nvPr>
-        </p:nvSpPr>
-        <p:spPr/>
-        <p:txBody>
-          <a:bodyPr/>
-          <a:lstStyle/>
-          <a:p>
-            <a:r>
-              <a:rPr lang="en-IE" dirty="0" smtClean="0"/>
-              <a:t>Html5 semantic elements</a:t>
-            </a:r>
-            <a:endParaRPr lang="en-IE" dirty="0"/>
-          </a:p>
-        </p:txBody>
-      </p:sp>
-      <p:sp>
-        <p:nvSpPr>
-          <p:cNvPr id="3" name="Content Placeholder 2"/>
-          <p:cNvSpPr>
-            <a:spLocks noGrp="1"/>
-          </p:cNvSpPr>
-          <p:nvPr>
-            <p:ph idx="1"/>
-          </p:nvPr>
-        </p:nvSpPr>
-        <p:spPr/>
-        <p:txBody>
-          <a:bodyPr/>
-          <a:lstStyle/>
-          <a:p>
-            <a:r>
-              <a:rPr lang="en-IE" dirty="0" smtClean="0"/>
-              <a:t>The need for semantic elements</a:t>
-            </a:r>
-          </a:p>
-          <a:p>
-            <a:r>
-              <a:rPr lang="en-IE" dirty="0" smtClean="0"/>
-              <a:t>Structural/layout elements</a:t>
-            </a:r>
-          </a:p>
-          <a:p>
-            <a:r>
-              <a:rPr lang="en-IE" dirty="0" smtClean="0"/>
-              <a:t>Figures and captions</a:t>
-            </a:r>
-          </a:p>
-          <a:p>
-            <a:endParaRPr lang="en-IE" dirty="0"/>
-          </a:p>
-        </p:txBody>
-      </p:sp>
-    </p:spTree>
-    <p:extLst>
-      <p:ext uri="{BB962C8B-B14F-4D97-AF65-F5344CB8AC3E}">
-        <p14:creationId xmlns:p14="http://schemas.microsoft.com/office/powerpoint/2010/main" val="707082873"/>
-      </p:ext>
-    </p:extLst>
-  </p:cSld>
-  <p:clrMapOvr>
-    <a:masterClrMapping/>
-  </p:clrMapOvr>
 </p:sld>
 </file>
 
@@ -10012,7 +10840,7 @@
         </p:spPr>
         <p:txBody>
           <a:bodyPr>
-            <a:normAutofit fontScale="92500" lnSpcReduction="10000"/>
+            <a:normAutofit fontScale="85000" lnSpcReduction="20000"/>
           </a:bodyPr>
           <a:lstStyle/>
           <a:p>
@@ -10059,8 +10887,27 @@
             </a:pPr>
             <a:r>
               <a:rPr sz="2100" dirty="0"/>
-              <a:t>&lt;section&gt;</a:t>
-            </a:r>
+              <a:t>&lt;section</a:t>
+            </a:r>
+            <a:r>
+              <a:rPr sz="2100" dirty="0" smtClean="0"/>
+              <a:t>&gt;</a:t>
+            </a:r>
+            <a:endParaRPr lang="en-IE" sz="2100" dirty="0" smtClean="0"/>
+          </a:p>
+          <a:p>
+            <a:pPr marL="0" indent="0" defTabSz="332708">
+              <a:spcBef>
+                <a:spcPts val="2391"/>
+              </a:spcBef>
+              <a:buNone/>
+              <a:defRPr sz="1800"/>
+            </a:pPr>
+            <a:r>
+              <a:rPr lang="en-IE" sz="2100" dirty="0" smtClean="0"/>
+              <a:t>&lt;main&gt;</a:t>
+            </a:r>
+            <a:endParaRPr sz="2100" dirty="0"/>
           </a:p>
           <a:p>
             <a:pPr marL="0" indent="0" defTabSz="332708">
@@ -10284,7 +11131,7 @@
           </a:ln>
           <a:extLst>
             <a:ext uri="{C572A759-6A51-4108-AA02-DFA0A04FC94B}">
-              <ma14:wrappingTextBoxFlag xmlns="" xmlns:ma14="http://schemas.microsoft.com/office/mac/drawingml/2011/main" val="1"/>
+              <ma14:wrappingTextBoxFlag xmlns:ma14="http://schemas.microsoft.com/office/mac/drawingml/2011/main" xmlns="" val="1"/>
             </a:ext>
           </a:extLst>
         </p:spPr>
@@ -11344,7 +12191,7 @@
           </a:ln>
           <a:extLst>
             <a:ext uri="{C572A759-6A51-4108-AA02-DFA0A04FC94B}">
-              <ma14:wrappingTextBoxFlag xmlns="" xmlns:ma14="http://schemas.microsoft.com/office/mac/drawingml/2011/main" val="1"/>
+              <ma14:wrappingTextBoxFlag xmlns:ma14="http://schemas.microsoft.com/office/mac/drawingml/2011/main" xmlns="" val="1"/>
             </a:ext>
           </a:extLst>
         </p:spPr>
@@ -12775,7 +13622,7 @@
           </a:ln>
           <a:extLst>
             <a:ext uri="{C572A759-6A51-4108-AA02-DFA0A04FC94B}">
-              <ma14:wrappingTextBoxFlag xmlns="" xmlns:ma14="http://schemas.microsoft.com/office/mac/drawingml/2011/main" val="1"/>
+              <ma14:wrappingTextBoxFlag xmlns:ma14="http://schemas.microsoft.com/office/mac/drawingml/2011/main" xmlns="" val="1"/>
             </a:ext>
           </a:extLst>
         </p:spPr>
@@ -13960,6 +14807,190 @@
 </file>
 
 <file path=ppt/slides/slide8.xml><?xml version="1.0" encoding="utf-8"?>
+<p:sld xmlns:a="http://schemas.openxmlformats.org/drawingml/2006/main" xmlns:r="http://schemas.openxmlformats.org/officeDocument/2006/relationships" xmlns:p="http://schemas.openxmlformats.org/presentationml/2006/main">
+  <p:cSld>
+    <p:spTree>
+      <p:nvGrpSpPr>
+        <p:cNvPr id="1" name=""/>
+        <p:cNvGrpSpPr/>
+        <p:nvPr/>
+      </p:nvGrpSpPr>
+      <p:grpSpPr>
+        <a:xfrm>
+          <a:off x="0" y="0"/>
+          <a:ext cx="0" cy="0"/>
+          <a:chOff x="0" y="0"/>
+          <a:chExt cx="0" cy="0"/>
+        </a:xfrm>
+      </p:grpSpPr>
+      <p:sp>
+        <p:nvSpPr>
+          <p:cNvPr id="73" name="Shape 73"/>
+          <p:cNvSpPr>
+            <a:spLocks noGrp="1"/>
+          </p:cNvSpPr>
+          <p:nvPr>
+            <p:ph type="title"/>
+          </p:nvPr>
+        </p:nvSpPr>
+        <p:spPr>
+          <a:prstGeom prst="rect">
+            <a:avLst/>
+          </a:prstGeom>
+        </p:spPr>
+        <p:txBody>
+          <a:bodyPr/>
+          <a:lstStyle/>
+          <a:p>
+            <a:pPr lvl="0">
+              <a:defRPr sz="1800"/>
+            </a:pPr>
+            <a:r>
+              <a:rPr sz="3000" dirty="0" smtClean="0"/>
+              <a:t>&lt;</a:t>
+            </a:r>
+            <a:r>
+              <a:rPr lang="en-IE" sz="3000" dirty="0" smtClean="0"/>
+              <a:t>main</a:t>
+            </a:r>
+            <a:r>
+              <a:rPr sz="3000" dirty="0" smtClean="0"/>
+              <a:t>&gt;</a:t>
+            </a:r>
+            <a:endParaRPr sz="3000" dirty="0"/>
+          </a:p>
+        </p:txBody>
+      </p:sp>
+      <p:sp>
+        <p:nvSpPr>
+          <p:cNvPr id="74" name="Shape 74"/>
+          <p:cNvSpPr>
+            <a:spLocks noGrp="1"/>
+          </p:cNvSpPr>
+          <p:nvPr>
+            <p:ph type="body" idx="1"/>
+          </p:nvPr>
+        </p:nvSpPr>
+        <p:spPr>
+          <a:xfrm>
+            <a:off x="932547" y="1676392"/>
+            <a:ext cx="3410853" cy="4383396"/>
+          </a:xfrm>
+          <a:prstGeom prst="rect">
+            <a:avLst/>
+          </a:prstGeom>
+        </p:spPr>
+        <p:txBody>
+          <a:bodyPr>
+            <a:normAutofit lnSpcReduction="10000"/>
+          </a:bodyPr>
+          <a:lstStyle>
+            <a:lvl1pPr marL="0" indent="0" defTabSz="502412">
+              <a:spcBef>
+                <a:spcPts val="3600"/>
+              </a:spcBef>
+              <a:buSzTx/>
+              <a:buFontTx/>
+              <a:buNone/>
+              <a:defRPr sz="3096" i="1"/>
+            </a:lvl1pPr>
+          </a:lstStyle>
+          <a:p>
+            <a:r>
+              <a:rPr lang="en-US" sz="2000" i="0" dirty="0"/>
+              <a:t>The main content of the body of a document or application. The main content area consists of content that is directly related to or expands upon the central topic of a document or central functionality of an application</a:t>
+            </a:r>
+            <a:r>
+              <a:rPr lang="en-US" sz="2000" i="0" dirty="0" smtClean="0"/>
+              <a:t>.</a:t>
+            </a:r>
+          </a:p>
+          <a:p>
+            <a:r>
+              <a:rPr lang="en-US" sz="2000" i="0" dirty="0" smtClean="0"/>
+              <a:t>Can only appear once on each page, and cannot be a descendant of elements such as </a:t>
+            </a:r>
+            <a:r>
+              <a:rPr lang="en-US" sz="2000" i="0" dirty="0" err="1" smtClean="0"/>
+              <a:t>nav</a:t>
+            </a:r>
+            <a:r>
+              <a:rPr lang="en-US" sz="2000" i="0" dirty="0" smtClean="0"/>
+              <a:t>, header, or footer.</a:t>
+            </a:r>
+            <a:endParaRPr lang="en-US" sz="2400" i="0" dirty="0"/>
+          </a:p>
+        </p:txBody>
+      </p:sp>
+      <p:pic>
+        <p:nvPicPr>
+          <p:cNvPr id="1026" name="Picture 2"/>
+          <p:cNvPicPr>
+            <a:picLocks noChangeAspect="1" noChangeArrowheads="1"/>
+          </p:cNvPicPr>
+          <p:nvPr/>
+        </p:nvPicPr>
+        <p:blipFill>
+          <a:blip r:embed="rId2">
+            <a:extLst>
+              <a:ext uri="{28A0092B-C50C-407E-A947-70E740481C1C}">
+                <a14:useLocalDpi xmlns:a14="http://schemas.microsoft.com/office/drawing/2010/main" val="0"/>
+              </a:ext>
+            </a:extLst>
+          </a:blip>
+          <a:srcRect/>
+          <a:stretch>
+            <a:fillRect/>
+          </a:stretch>
+        </p:blipFill>
+        <p:spPr bwMode="auto">
+          <a:xfrm>
+            <a:off x="4495800" y="1724025"/>
+            <a:ext cx="4038600" cy="3076575"/>
+          </a:xfrm>
+          <a:prstGeom prst="rect">
+            <a:avLst/>
+          </a:prstGeom>
+          <a:noFill/>
+          <a:ln>
+            <a:noFill/>
+          </a:ln>
+          <a:extLst>
+            <a:ext uri="{909E8E84-426E-40DD-AFC4-6F175D3DCCD1}">
+              <a14:hiddenFill xmlns:a14="http://schemas.microsoft.com/office/drawing/2010/main">
+                <a:solidFill>
+                  <a:schemeClr val="accent1"/>
+                </a:solidFill>
+              </a14:hiddenFill>
+            </a:ext>
+            <a:ext uri="{91240B29-F687-4F45-9708-019B960494DF}">
+              <a14:hiddenLine xmlns:a14="http://schemas.microsoft.com/office/drawing/2010/main" w="9525">
+                <a:solidFill>
+                  <a:schemeClr val="tx1"/>
+                </a:solidFill>
+                <a:miter lim="800000"/>
+                <a:headEnd/>
+                <a:tailEnd/>
+              </a14:hiddenLine>
+            </a:ext>
+          </a:extLst>
+        </p:spPr>
+      </p:pic>
+    </p:spTree>
+    <p:extLst>
+      <p:ext uri="{BB962C8B-B14F-4D97-AF65-F5344CB8AC3E}">
+        <p14:creationId xmlns:p14="http://schemas.microsoft.com/office/powerpoint/2010/main" val="2013186306"/>
+      </p:ext>
+    </p:extLst>
+  </p:cSld>
+  <p:clrMapOvr>
+    <a:masterClrMapping/>
+  </p:clrMapOvr>
+  <p:transition spd="med"/>
+</p:sld>
+</file>
+
+<file path=ppt/slides/slide9.xml><?xml version="1.0" encoding="utf-8"?>
 <p:sld xmlns:a="http://schemas.openxmlformats.org/drawingml/2006/main" xmlns:r="http://schemas.openxmlformats.org/officeDocument/2006/relationships" xmlns:p="http://schemas.openxmlformats.org/presentationml/2006/main">
   <p:cSld>
     <p:spTree>
@@ -14070,7 +15101,7 @@
           </a:ln>
           <a:extLst>
             <a:ext uri="{C572A759-6A51-4108-AA02-DFA0A04FC94B}">
-              <ma14:wrappingTextBoxFlag xmlns="" xmlns:ma14="http://schemas.microsoft.com/office/mac/drawingml/2011/main" val="1"/>
+              <ma14:wrappingTextBoxFlag xmlns:ma14="http://schemas.microsoft.com/office/mac/drawingml/2011/main" xmlns="" val="1"/>
             </a:ext>
           </a:extLst>
         </p:spPr>
@@ -14417,737 +15448,6 @@
     <p:extLst>
       <p:ext uri="{BB962C8B-B14F-4D97-AF65-F5344CB8AC3E}">
         <p14:creationId xmlns:p14="http://schemas.microsoft.com/office/powerpoint/2010/main" val="2746838445"/>
-      </p:ext>
-    </p:extLst>
-  </p:cSld>
-  <p:clrMapOvr>
-    <a:masterClrMapping/>
-  </p:clrMapOvr>
-  <p:transition spd="med"/>
-</p:sld>
-</file>
-
-<file path=ppt/slides/slide9.xml><?xml version="1.0" encoding="utf-8"?>
-<p:sld xmlns:a="http://schemas.openxmlformats.org/drawingml/2006/main" xmlns:r="http://schemas.openxmlformats.org/officeDocument/2006/relationships" xmlns:p="http://schemas.openxmlformats.org/presentationml/2006/main">
-  <p:cSld>
-    <p:spTree>
-      <p:nvGrpSpPr>
-        <p:cNvPr id="1" name=""/>
-        <p:cNvGrpSpPr/>
-        <p:nvPr/>
-      </p:nvGrpSpPr>
-      <p:grpSpPr>
-        <a:xfrm>
-          <a:off x="0" y="0"/>
-          <a:ext cx="0" cy="0"/>
-          <a:chOff x="0" y="0"/>
-          <a:chExt cx="0" cy="0"/>
-        </a:xfrm>
-      </p:grpSpPr>
-      <p:sp>
-        <p:nvSpPr>
-          <p:cNvPr id="81" name="Shape 81"/>
-          <p:cNvSpPr>
-            <a:spLocks noGrp="1"/>
-          </p:cNvSpPr>
-          <p:nvPr>
-            <p:ph type="title"/>
-          </p:nvPr>
-        </p:nvSpPr>
-        <p:spPr>
-          <a:prstGeom prst="rect">
-            <a:avLst/>
-          </a:prstGeom>
-        </p:spPr>
-        <p:txBody>
-          <a:bodyPr/>
-          <a:lstStyle/>
-          <a:p>
-            <a:pPr lvl="0">
-              <a:defRPr sz="1800"/>
-            </a:pPr>
-            <a:r>
-              <a:rPr sz="3000"/>
-              <a:t>&lt;header&gt; &amp; &lt;footer&gt;</a:t>
-            </a:r>
-          </a:p>
-        </p:txBody>
-      </p:sp>
-      <p:sp>
-        <p:nvSpPr>
-          <p:cNvPr id="82" name="Shape 82"/>
-          <p:cNvSpPr>
-            <a:spLocks noGrp="1"/>
-          </p:cNvSpPr>
-          <p:nvPr>
-            <p:ph type="body" idx="1"/>
-          </p:nvPr>
-        </p:nvSpPr>
-        <p:spPr>
-          <a:xfrm>
-            <a:off x="1066800" y="1447800"/>
-            <a:ext cx="3634959" cy="2079676"/>
-          </a:xfrm>
-          <a:prstGeom prst="rect">
-            <a:avLst/>
-          </a:prstGeom>
-        </p:spPr>
-        <p:txBody>
-          <a:bodyPr>
-            <a:normAutofit fontScale="92500"/>
-          </a:bodyPr>
-          <a:lstStyle>
-            <a:lvl1pPr marL="0" indent="0" defTabSz="438150">
-              <a:spcBef>
-                <a:spcPts val="3100"/>
-              </a:spcBef>
-              <a:buSzTx/>
-              <a:buFontTx/>
-              <a:buNone/>
-              <a:defRPr sz="2700" i="1"/>
-            </a:lvl1pPr>
-          </a:lstStyle>
-          <a:p>
-            <a:pPr lvl="0">
-              <a:defRPr sz="1800" i="0"/>
-            </a:pPr>
-            <a:r>
-              <a:rPr sz="1900" dirty="0"/>
-              <a:t>"The header element represents introductory content for its nearest ancestor sectioning content or sectioning root element. A header typically contains a group of introductory or navigational aids.”</a:t>
-            </a:r>
-          </a:p>
-        </p:txBody>
-      </p:sp>
-      <p:sp>
-        <p:nvSpPr>
-          <p:cNvPr id="83" name="Shape 83"/>
-          <p:cNvSpPr/>
-          <p:nvPr/>
-        </p:nvSpPr>
-        <p:spPr>
-          <a:xfrm>
-            <a:off x="1219200" y="3886200"/>
-            <a:ext cx="3770578" cy="2214563"/>
-          </a:xfrm>
-          <a:prstGeom prst="rect">
-            <a:avLst/>
-          </a:prstGeom>
-          <a:ln w="12700">
-            <a:miter lim="400000"/>
-          </a:ln>
-          <a:extLst>
-            <a:ext uri="{C572A759-6A51-4108-AA02-DFA0A04FC94B}">
-              <ma14:wrappingTextBoxFlag xmlns="" xmlns:ma14="http://schemas.microsoft.com/office/mac/drawingml/2011/main" val="1"/>
-            </a:ext>
-          </a:extLst>
-        </p:spPr>
-        <p:txBody>
-          <a:bodyPr lIns="0" tIns="0" rIns="0" bIns="0">
-            <a:normAutofit/>
-          </a:bodyPr>
-          <a:lstStyle>
-            <a:lvl1pPr algn="l" defTabSz="414781">
-              <a:spcBef>
-                <a:spcPts val="2900"/>
-              </a:spcBef>
-              <a:defRPr sz="2556" i="1"/>
-            </a:lvl1pPr>
-          </a:lstStyle>
-          <a:p>
-            <a:pPr lvl="0">
-              <a:defRPr sz="1800" i="0"/>
-            </a:pPr>
-            <a:r>
-              <a:rPr sz="1800" dirty="0"/>
-              <a:t>"The footer element represents a footer for its nearest ancestor sectioning content or sectioning root element. A footer typically contains information about its section such as who wrote it, links to related documents, copyright data, and the like..”</a:t>
-            </a:r>
-          </a:p>
-        </p:txBody>
-      </p:sp>
-      <p:sp>
-        <p:nvSpPr>
-          <p:cNvPr id="84" name="Shape 84"/>
-          <p:cNvSpPr/>
-          <p:nvPr/>
-        </p:nvSpPr>
-        <p:spPr>
-          <a:xfrm>
-            <a:off x="5729774" y="2528754"/>
-            <a:ext cx="2576026" cy="1800493"/>
-          </a:xfrm>
-          <a:prstGeom prst="rect">
-            <a:avLst/>
-          </a:prstGeom>
-          <a:ln w="12700">
-            <a:solidFill/>
-            <a:miter lim="400000"/>
-          </a:ln>
-          <a:extLst>
-            <a:ext uri="{C572A759-6A51-4108-AA02-DFA0A04FC94B}">
-              <ma14:wrappingTextBoxFlag xmlns="" xmlns:ma14="http://schemas.microsoft.com/office/mac/drawingml/2011/main" val="1"/>
-            </a:ext>
-          </a:extLst>
-        </p:spPr>
-        <p:txBody>
-          <a:bodyPr wrap="none" lIns="0" tIns="0" rIns="0" bIns="0" anchor="ctr">
-            <a:spAutoFit/>
-          </a:bodyPr>
-          <a:lstStyle/>
-          <a:p>
-            <a:pPr defTabSz="321457">
-              <a:defRPr sz="1800"/>
-            </a:pPr>
-            <a:r>
-              <a:rPr sz="1300">
-                <a:solidFill>
-                  <a:srgbClr val="009193"/>
-                </a:solidFill>
-                <a:latin typeface="Monaco"/>
-                <a:ea typeface="Monaco"/>
-                <a:cs typeface="Monaco"/>
-                <a:sym typeface="Monaco"/>
-              </a:rPr>
-              <a:t>&lt;</a:t>
-            </a:r>
-            <a:r>
-              <a:rPr sz="1300">
-                <a:solidFill>
-                  <a:srgbClr val="4E9192"/>
-                </a:solidFill>
-                <a:latin typeface="Monaco"/>
-                <a:ea typeface="Monaco"/>
-                <a:cs typeface="Monaco"/>
-                <a:sym typeface="Monaco"/>
-              </a:rPr>
-              <a:t>header</a:t>
-            </a:r>
-            <a:r>
-              <a:rPr sz="1300">
-                <a:solidFill>
-                  <a:srgbClr val="009193"/>
-                </a:solidFill>
-                <a:latin typeface="Monaco"/>
-                <a:ea typeface="Monaco"/>
-                <a:cs typeface="Monaco"/>
-                <a:sym typeface="Monaco"/>
-              </a:rPr>
-              <a:t>&gt;</a:t>
-            </a:r>
-            <a:endParaRPr sz="1300">
-              <a:latin typeface="Monaco"/>
-              <a:ea typeface="Monaco"/>
-              <a:cs typeface="Monaco"/>
-              <a:sym typeface="Monaco"/>
-            </a:endParaRPr>
-          </a:p>
-          <a:p>
-            <a:pPr defTabSz="321457">
-              <a:defRPr sz="1800"/>
-            </a:pPr>
-            <a:r>
-              <a:rPr sz="1300">
-                <a:latin typeface="Monaco"/>
-                <a:ea typeface="Monaco"/>
-                <a:cs typeface="Monaco"/>
-                <a:sym typeface="Monaco"/>
-              </a:rPr>
-              <a:t> </a:t>
-            </a:r>
-            <a:r>
-              <a:rPr sz="1300">
-                <a:solidFill>
-                  <a:srgbClr val="009193"/>
-                </a:solidFill>
-                <a:latin typeface="Monaco"/>
-                <a:ea typeface="Monaco"/>
-                <a:cs typeface="Monaco"/>
-                <a:sym typeface="Monaco"/>
-              </a:rPr>
-              <a:t>&lt;</a:t>
-            </a:r>
-            <a:r>
-              <a:rPr sz="1300">
-                <a:solidFill>
-                  <a:srgbClr val="4E9192"/>
-                </a:solidFill>
-                <a:latin typeface="Monaco"/>
-                <a:ea typeface="Monaco"/>
-                <a:cs typeface="Monaco"/>
-                <a:sym typeface="Monaco"/>
-              </a:rPr>
-              <a:t>p</a:t>
-            </a:r>
-            <a:r>
-              <a:rPr sz="1300">
-                <a:solidFill>
-                  <a:srgbClr val="009193"/>
-                </a:solidFill>
-                <a:latin typeface="Monaco"/>
-                <a:ea typeface="Monaco"/>
-                <a:cs typeface="Monaco"/>
-                <a:sym typeface="Monaco"/>
-              </a:rPr>
-              <a:t>&gt;</a:t>
-            </a:r>
-            <a:r>
-              <a:rPr sz="1300">
-                <a:latin typeface="Monaco"/>
-                <a:ea typeface="Monaco"/>
-                <a:cs typeface="Monaco"/>
-                <a:sym typeface="Monaco"/>
-              </a:rPr>
-              <a:t>Welcome to...</a:t>
-            </a:r>
-            <a:r>
-              <a:rPr sz="1300">
-                <a:solidFill>
-                  <a:srgbClr val="009193"/>
-                </a:solidFill>
-                <a:latin typeface="Monaco"/>
-                <a:ea typeface="Monaco"/>
-                <a:cs typeface="Monaco"/>
-                <a:sym typeface="Monaco"/>
-              </a:rPr>
-              <a:t>&lt;/</a:t>
-            </a:r>
-            <a:r>
-              <a:rPr sz="1300">
-                <a:solidFill>
-                  <a:srgbClr val="4E9192"/>
-                </a:solidFill>
-                <a:latin typeface="Monaco"/>
-                <a:ea typeface="Monaco"/>
-                <a:cs typeface="Monaco"/>
-                <a:sym typeface="Monaco"/>
-              </a:rPr>
-              <a:t>p</a:t>
-            </a:r>
-            <a:r>
-              <a:rPr sz="1300">
-                <a:solidFill>
-                  <a:srgbClr val="009193"/>
-                </a:solidFill>
-                <a:latin typeface="Monaco"/>
-                <a:ea typeface="Monaco"/>
-                <a:cs typeface="Monaco"/>
-                <a:sym typeface="Monaco"/>
-              </a:rPr>
-              <a:t>&gt;</a:t>
-            </a:r>
-            <a:endParaRPr sz="1300">
-              <a:latin typeface="Monaco"/>
-              <a:ea typeface="Monaco"/>
-              <a:cs typeface="Monaco"/>
-              <a:sym typeface="Monaco"/>
-            </a:endParaRPr>
-          </a:p>
-          <a:p>
-            <a:pPr defTabSz="321457">
-              <a:defRPr sz="1800"/>
-            </a:pPr>
-            <a:r>
-              <a:rPr sz="1300">
-                <a:latin typeface="Monaco"/>
-                <a:ea typeface="Monaco"/>
-                <a:cs typeface="Monaco"/>
-                <a:sym typeface="Monaco"/>
-              </a:rPr>
-              <a:t> </a:t>
-            </a:r>
-            <a:r>
-              <a:rPr sz="1300">
-                <a:solidFill>
-                  <a:srgbClr val="009193"/>
-                </a:solidFill>
-                <a:latin typeface="Monaco"/>
-                <a:ea typeface="Monaco"/>
-                <a:cs typeface="Monaco"/>
-                <a:sym typeface="Monaco"/>
-              </a:rPr>
-              <a:t>&lt;</a:t>
-            </a:r>
-            <a:r>
-              <a:rPr sz="1300">
-                <a:solidFill>
-                  <a:srgbClr val="4E9192"/>
-                </a:solidFill>
-                <a:latin typeface="Monaco"/>
-                <a:ea typeface="Monaco"/>
-                <a:cs typeface="Monaco"/>
-                <a:sym typeface="Monaco"/>
-              </a:rPr>
-              <a:t>h1</a:t>
-            </a:r>
-            <a:r>
-              <a:rPr sz="1300">
-                <a:solidFill>
-                  <a:srgbClr val="009193"/>
-                </a:solidFill>
-                <a:latin typeface="Monaco"/>
-                <a:ea typeface="Monaco"/>
-                <a:cs typeface="Monaco"/>
-                <a:sym typeface="Monaco"/>
-              </a:rPr>
-              <a:t>&gt;</a:t>
-            </a:r>
-            <a:r>
-              <a:rPr sz="1300">
-                <a:latin typeface="Monaco"/>
-                <a:ea typeface="Monaco"/>
-                <a:cs typeface="Monaco"/>
-                <a:sym typeface="Monaco"/>
-              </a:rPr>
-              <a:t>Voidwars!</a:t>
-            </a:r>
-            <a:r>
-              <a:rPr sz="1300">
-                <a:solidFill>
-                  <a:srgbClr val="009193"/>
-                </a:solidFill>
-                <a:latin typeface="Monaco"/>
-                <a:ea typeface="Monaco"/>
-                <a:cs typeface="Monaco"/>
-                <a:sym typeface="Monaco"/>
-              </a:rPr>
-              <a:t>&lt;/</a:t>
-            </a:r>
-            <a:r>
-              <a:rPr sz="1300">
-                <a:solidFill>
-                  <a:srgbClr val="4E9192"/>
-                </a:solidFill>
-                <a:latin typeface="Monaco"/>
-                <a:ea typeface="Monaco"/>
-                <a:cs typeface="Monaco"/>
-                <a:sym typeface="Monaco"/>
-              </a:rPr>
-              <a:t>h1</a:t>
-            </a:r>
-            <a:r>
-              <a:rPr sz="1300">
-                <a:solidFill>
-                  <a:srgbClr val="009193"/>
-                </a:solidFill>
-                <a:latin typeface="Monaco"/>
-                <a:ea typeface="Monaco"/>
-                <a:cs typeface="Monaco"/>
-                <a:sym typeface="Monaco"/>
-              </a:rPr>
-              <a:t>&gt;</a:t>
-            </a:r>
-            <a:endParaRPr sz="1300">
-              <a:latin typeface="Monaco"/>
-              <a:ea typeface="Monaco"/>
-              <a:cs typeface="Monaco"/>
-              <a:sym typeface="Monaco"/>
-            </a:endParaRPr>
-          </a:p>
-          <a:p>
-            <a:pPr defTabSz="321457">
-              <a:defRPr sz="1800"/>
-            </a:pPr>
-            <a:r>
-              <a:rPr sz="1300">
-                <a:solidFill>
-                  <a:srgbClr val="009193"/>
-                </a:solidFill>
-                <a:latin typeface="Monaco"/>
-                <a:ea typeface="Monaco"/>
-                <a:cs typeface="Monaco"/>
-                <a:sym typeface="Monaco"/>
-              </a:rPr>
-              <a:t>&lt;/</a:t>
-            </a:r>
-            <a:r>
-              <a:rPr sz="1300">
-                <a:solidFill>
-                  <a:srgbClr val="4E9192"/>
-                </a:solidFill>
-                <a:latin typeface="Monaco"/>
-                <a:ea typeface="Monaco"/>
-                <a:cs typeface="Monaco"/>
-                <a:sym typeface="Monaco"/>
-              </a:rPr>
-              <a:t>header</a:t>
-            </a:r>
-            <a:r>
-              <a:rPr sz="1300">
-                <a:solidFill>
-                  <a:srgbClr val="009193"/>
-                </a:solidFill>
-                <a:latin typeface="Monaco"/>
-                <a:ea typeface="Monaco"/>
-                <a:cs typeface="Monaco"/>
-                <a:sym typeface="Monaco"/>
-              </a:rPr>
-              <a:t>&gt;</a:t>
-            </a:r>
-            <a:endParaRPr sz="1300">
-              <a:latin typeface="Monaco"/>
-              <a:ea typeface="Monaco"/>
-              <a:cs typeface="Monaco"/>
-              <a:sym typeface="Monaco"/>
-            </a:endParaRPr>
-          </a:p>
-          <a:p>
-            <a:pPr defTabSz="321457">
-              <a:defRPr sz="1800"/>
-            </a:pPr>
-            <a:endParaRPr sz="1300">
-              <a:latin typeface="Monaco"/>
-              <a:ea typeface="Monaco"/>
-              <a:cs typeface="Monaco"/>
-              <a:sym typeface="Monaco"/>
-            </a:endParaRPr>
-          </a:p>
-          <a:p>
-            <a:pPr defTabSz="321457">
-              <a:defRPr sz="1800"/>
-            </a:pPr>
-            <a:endParaRPr sz="1300">
-              <a:latin typeface="Monaco"/>
-              <a:ea typeface="Monaco"/>
-              <a:cs typeface="Monaco"/>
-              <a:sym typeface="Monaco"/>
-            </a:endParaRPr>
-          </a:p>
-          <a:p>
-            <a:pPr defTabSz="321457">
-              <a:defRPr sz="1800"/>
-            </a:pPr>
-            <a:r>
-              <a:rPr sz="1300">
-                <a:solidFill>
-                  <a:srgbClr val="009193"/>
-                </a:solidFill>
-                <a:latin typeface="Monaco"/>
-                <a:ea typeface="Monaco"/>
-                <a:cs typeface="Monaco"/>
-                <a:sym typeface="Monaco"/>
-              </a:rPr>
-              <a:t>&lt;</a:t>
-            </a:r>
-            <a:r>
-              <a:rPr sz="1300">
-                <a:solidFill>
-                  <a:srgbClr val="4E9192"/>
-                </a:solidFill>
-                <a:latin typeface="Monaco"/>
-                <a:ea typeface="Monaco"/>
-                <a:cs typeface="Monaco"/>
-                <a:sym typeface="Monaco"/>
-              </a:rPr>
-              <a:t>footer</a:t>
-            </a:r>
-            <a:r>
-              <a:rPr sz="1300">
-                <a:solidFill>
-                  <a:srgbClr val="009193"/>
-                </a:solidFill>
-                <a:latin typeface="Monaco"/>
-                <a:ea typeface="Monaco"/>
-                <a:cs typeface="Monaco"/>
-                <a:sym typeface="Monaco"/>
-              </a:rPr>
-              <a:t>&gt;</a:t>
-            </a:r>
-            <a:endParaRPr sz="1300">
-              <a:latin typeface="Monaco"/>
-              <a:ea typeface="Monaco"/>
-              <a:cs typeface="Monaco"/>
-              <a:sym typeface="Monaco"/>
-            </a:endParaRPr>
-          </a:p>
-          <a:p>
-            <a:pPr defTabSz="321457">
-              <a:defRPr sz="1800"/>
-            </a:pPr>
-            <a:r>
-              <a:rPr sz="1300">
-                <a:latin typeface="Monaco"/>
-                <a:ea typeface="Monaco"/>
-                <a:cs typeface="Monaco"/>
-                <a:sym typeface="Monaco"/>
-              </a:rPr>
-              <a:t>  </a:t>
-            </a:r>
-            <a:r>
-              <a:rPr sz="1300">
-                <a:solidFill>
-                  <a:srgbClr val="009193"/>
-                </a:solidFill>
-                <a:latin typeface="Monaco"/>
-                <a:ea typeface="Monaco"/>
-                <a:cs typeface="Monaco"/>
-                <a:sym typeface="Monaco"/>
-              </a:rPr>
-              <a:t>&lt;</a:t>
-            </a:r>
-            <a:r>
-              <a:rPr sz="1300">
-                <a:solidFill>
-                  <a:srgbClr val="4E9192"/>
-                </a:solidFill>
-                <a:latin typeface="Monaco"/>
-                <a:ea typeface="Monaco"/>
-                <a:cs typeface="Monaco"/>
-                <a:sym typeface="Monaco"/>
-              </a:rPr>
-              <a:t>a</a:t>
-            </a:r>
-            <a:r>
-              <a:rPr sz="1300">
-                <a:latin typeface="Monaco"/>
-                <a:ea typeface="Monaco"/>
-                <a:cs typeface="Monaco"/>
-                <a:sym typeface="Monaco"/>
-              </a:rPr>
-              <a:t> </a:t>
-            </a:r>
-            <a:r>
-              <a:rPr sz="1300">
-                <a:solidFill>
-                  <a:srgbClr val="932192"/>
-                </a:solidFill>
-                <a:latin typeface="Monaco"/>
-                <a:ea typeface="Monaco"/>
-                <a:cs typeface="Monaco"/>
-                <a:sym typeface="Monaco"/>
-              </a:rPr>
-              <a:t>href</a:t>
-            </a:r>
-            <a:r>
-              <a:rPr sz="1300">
-                <a:latin typeface="Monaco"/>
-                <a:ea typeface="Monaco"/>
-                <a:cs typeface="Monaco"/>
-                <a:sym typeface="Monaco"/>
-              </a:rPr>
-              <a:t>=</a:t>
-            </a:r>
-            <a:r>
-              <a:rPr sz="1300">
-                <a:solidFill>
-                  <a:srgbClr val="3933FF"/>
-                </a:solidFill>
-                <a:latin typeface="Monaco"/>
-                <a:ea typeface="Monaco"/>
-                <a:cs typeface="Monaco"/>
-                <a:sym typeface="Monaco"/>
-              </a:rPr>
-              <a:t>"../"</a:t>
-            </a:r>
-            <a:r>
-              <a:rPr sz="1300">
-                <a:solidFill>
-                  <a:srgbClr val="009193"/>
-                </a:solidFill>
-                <a:latin typeface="Monaco"/>
-                <a:ea typeface="Monaco"/>
-                <a:cs typeface="Monaco"/>
-                <a:sym typeface="Monaco"/>
-              </a:rPr>
-              <a:t>&gt;</a:t>
-            </a:r>
-            <a:r>
-              <a:rPr sz="1300">
-                <a:latin typeface="Monaco"/>
-                <a:ea typeface="Monaco"/>
-                <a:cs typeface="Monaco"/>
-                <a:sym typeface="Monaco"/>
-              </a:rPr>
-              <a:t>Back to index…</a:t>
-            </a:r>
-            <a:r>
-              <a:rPr sz="1300">
-                <a:solidFill>
-                  <a:srgbClr val="009193"/>
-                </a:solidFill>
-                <a:latin typeface="Monaco"/>
-                <a:ea typeface="Monaco"/>
-                <a:cs typeface="Monaco"/>
-                <a:sym typeface="Monaco"/>
-              </a:rPr>
-              <a:t>&lt;/</a:t>
-            </a:r>
-            <a:r>
-              <a:rPr sz="1300">
-                <a:solidFill>
-                  <a:srgbClr val="4E9192"/>
-                </a:solidFill>
-                <a:latin typeface="Monaco"/>
-                <a:ea typeface="Monaco"/>
-                <a:cs typeface="Monaco"/>
-                <a:sym typeface="Monaco"/>
-              </a:rPr>
-              <a:t>a</a:t>
-            </a:r>
-            <a:r>
-              <a:rPr sz="1300">
-                <a:solidFill>
-                  <a:srgbClr val="009193"/>
-                </a:solidFill>
-                <a:latin typeface="Monaco"/>
-                <a:ea typeface="Monaco"/>
-                <a:cs typeface="Monaco"/>
-                <a:sym typeface="Monaco"/>
-              </a:rPr>
-              <a:t>&gt;</a:t>
-            </a:r>
-            <a:endParaRPr sz="1300">
-              <a:latin typeface="Monaco"/>
-              <a:ea typeface="Monaco"/>
-              <a:cs typeface="Monaco"/>
-              <a:sym typeface="Monaco"/>
-            </a:endParaRPr>
-          </a:p>
-          <a:p>
-            <a:pPr defTabSz="321457">
-              <a:defRPr sz="1800"/>
-            </a:pPr>
-            <a:r>
-              <a:rPr sz="1300">
-                <a:solidFill>
-                  <a:srgbClr val="009193"/>
-                </a:solidFill>
-                <a:latin typeface="Monaco"/>
-                <a:ea typeface="Monaco"/>
-                <a:cs typeface="Monaco"/>
-                <a:sym typeface="Monaco"/>
-              </a:rPr>
-              <a:t>&lt;/</a:t>
-            </a:r>
-            <a:r>
-              <a:rPr sz="1300">
-                <a:solidFill>
-                  <a:srgbClr val="4E9192"/>
-                </a:solidFill>
-                <a:latin typeface="Monaco"/>
-                <a:ea typeface="Monaco"/>
-                <a:cs typeface="Monaco"/>
-                <a:sym typeface="Monaco"/>
-              </a:rPr>
-              <a:t>footer</a:t>
-            </a:r>
-            <a:r>
-              <a:rPr sz="1300">
-                <a:solidFill>
-                  <a:srgbClr val="009193"/>
-                </a:solidFill>
-                <a:latin typeface="Monaco"/>
-                <a:ea typeface="Monaco"/>
-                <a:cs typeface="Monaco"/>
-                <a:sym typeface="Monaco"/>
-              </a:rPr>
-              <a:t>&gt;</a:t>
-            </a:r>
-          </a:p>
-        </p:txBody>
-      </p:sp>
-    </p:spTree>
-    <p:extLst>
-      <p:ext uri="{BB962C8B-B14F-4D97-AF65-F5344CB8AC3E}">
-        <p14:creationId xmlns:p14="http://schemas.microsoft.com/office/powerpoint/2010/main" val="3904904131"/>
       </p:ext>
     </p:extLst>
   </p:cSld>
@@ -15412,7 +15712,7 @@
   <a:extraClrSchemeLst/>
   <a:extLst>
     <a:ext uri="{05A4C25C-085E-4340-85A3-A5531E510DB2}">
-      <thm15:themeFamily xmlns:thm15="http://schemas.microsoft.com/office/thememl/2012/main" xmlns="" name="Badge" id="{71A07785-5930-41D4-9A83-E23602B48E98}" vid="{771EA782-DFA6-45B1-AEA3-661F1715B310}"/>
+      <thm15:themeFamily xmlns="" xmlns:thm15="http://schemas.microsoft.com/office/thememl/2012/main" name="Badge" id="{71A07785-5930-41D4-9A83-E23602B48E98}" vid="{771EA782-DFA6-45B1-AEA3-661F1715B310}"/>
     </a:ext>
   </a:extLst>
 </a:theme>
@@ -15673,7 +15973,7 @@
   <a:extraClrSchemeLst/>
   <a:extLst>
     <a:ext uri="{05A4C25C-085E-4340-85A3-A5531E510DB2}">
-      <thm15:themeFamily xmlns:thm15="http://schemas.microsoft.com/office/thememl/2012/main" xmlns="" name="Office Theme" id="{62F939B6-93AF-4DB8-9C6B-D6C7DFDC589F}" vid="{4A3C46E8-61CC-4603-A589-7422A47A8E4A}"/>
+      <thm15:themeFamily xmlns="" xmlns:thm15="http://schemas.microsoft.com/office/thememl/2012/main" name="Office Theme" id="{62F939B6-93AF-4DB8-9C6B-D6C7DFDC589F}" vid="{4A3C46E8-61CC-4603-A589-7422A47A8E4A}"/>
     </a:ext>
   </a:extLst>
 </a:theme>

</xml_diff>